<commit_message>
updates for senior project
</commit_message>
<xml_diff>
--- a/CommandLine/CommandLine.pptx
+++ b/CommandLine/CommandLine.pptx
@@ -219,7 +219,7 @@
           <a:p>
             <a:fld id="{19104133-B5B0-4351-8158-4F0E5EB1E2BF}" type="datetimeFigureOut">
               <a:rPr lang="en-US" smtClean="0"/>
-              <a:t>12/2/2019</a:t>
+              <a:t>5/11/2020</a:t>
             </a:fld>
             <a:endParaRPr lang="en-US"/>
           </a:p>
@@ -1113,7 +1113,7 @@
             <a:fld id="{1C2D31DE-C454-491C-B5C3-F097855E3DF7}" type="datetime4">
               <a:rPr lang="en-US" smtClean="0"/>
               <a:pPr/>
-              <a:t>December 2, 2019</a:t>
+              <a:t>May 11, 2020</a:t>
             </a:fld>
             <a:endParaRPr lang="en-US" dirty="0"/>
           </a:p>
@@ -4513,7 +4513,7 @@
           <a:p>
             <a:fld id="{5958763E-B898-436D-883D-03711491D54A}" type="datetimeFigureOut">
               <a:rPr lang="en-US" smtClean="0"/>
-              <a:t>12/2/2019</a:t>
+              <a:t>5/11/2020</a:t>
             </a:fld>
             <a:endParaRPr lang="en-US"/>
           </a:p>
@@ -4714,7 +4714,7 @@
           <a:p>
             <a:fld id="{5958763E-B898-436D-883D-03711491D54A}" type="datetimeFigureOut">
               <a:rPr lang="en-US" smtClean="0"/>
-              <a:t>12/2/2019</a:t>
+              <a:t>5/11/2020</a:t>
             </a:fld>
             <a:endParaRPr lang="en-US"/>
           </a:p>
@@ -4971,7 +4971,7 @@
           <a:p>
             <a:fld id="{5958763E-B898-436D-883D-03711491D54A}" type="datetimeFigureOut">
               <a:rPr lang="en-US" smtClean="0"/>
-              <a:t>12/2/2019</a:t>
+              <a:t>5/11/2020</a:t>
             </a:fld>
             <a:endParaRPr lang="en-US"/>
           </a:p>
@@ -5326,7 +5326,7 @@
           <a:p>
             <a:fld id="{5958763E-B898-436D-883D-03711491D54A}" type="datetimeFigureOut">
               <a:rPr lang="en-US" smtClean="0"/>
-              <a:t>12/2/2019</a:t>
+              <a:t>5/11/2020</a:t>
             </a:fld>
             <a:endParaRPr lang="en-US"/>
           </a:p>
@@ -5749,7 +5749,7 @@
           <a:p>
             <a:fld id="{5958763E-B898-436D-883D-03711491D54A}" type="datetimeFigureOut">
               <a:rPr lang="en-US" smtClean="0"/>
-              <a:t>12/2/2019</a:t>
+              <a:t>5/11/2020</a:t>
             </a:fld>
             <a:endParaRPr lang="en-US"/>
           </a:p>
@@ -6257,7 +6257,7 @@
           <a:p>
             <a:fld id="{5958763E-B898-436D-883D-03711491D54A}" type="datetimeFigureOut">
               <a:rPr lang="en-US" smtClean="0"/>
-              <a:t>12/2/2019</a:t>
+              <a:t>5/11/2020</a:t>
             </a:fld>
             <a:endParaRPr lang="en-US"/>
           </a:p>
@@ -6715,7 +6715,7 @@
           <a:p>
             <a:fld id="{5958763E-B898-436D-883D-03711491D54A}" type="datetimeFigureOut">
               <a:rPr lang="en-US" smtClean="0"/>
-              <a:t>12/2/2019</a:t>
+              <a:t>5/11/2020</a:t>
             </a:fld>
             <a:endParaRPr lang="en-US"/>
           </a:p>
@@ -7333,7 +7333,7 @@
           <a:p>
             <a:fld id="{5958763E-B898-436D-883D-03711491D54A}" type="datetimeFigureOut">
               <a:rPr lang="en-US" smtClean="0"/>
-              <a:t>12/2/2019</a:t>
+              <a:t>5/11/2020</a:t>
             </a:fld>
             <a:endParaRPr lang="en-US"/>
           </a:p>
@@ -8111,7 +8111,7 @@
           <a:p>
             <a:fld id="{5958763E-B898-436D-883D-03711491D54A}" type="datetimeFigureOut">
               <a:rPr lang="en-US" smtClean="0"/>
-              <a:t>12/2/2019</a:t>
+              <a:t>5/11/2020</a:t>
             </a:fld>
             <a:endParaRPr lang="en-US"/>
           </a:p>
@@ -8222,7 +8222,7 @@
           <a:p>
             <a:fld id="{5958763E-B898-436D-883D-03711491D54A}" type="datetimeFigureOut">
               <a:rPr lang="en-US" smtClean="0"/>
-              <a:t>12/2/2019</a:t>
+              <a:t>5/11/2020</a:t>
             </a:fld>
             <a:endParaRPr lang="en-US"/>
           </a:p>
@@ -8564,7 +8564,7 @@
             <a:fld id="{1C2D31DE-C454-491C-B5C3-F097855E3DF7}" type="datetime4">
               <a:rPr lang="en-US" smtClean="0"/>
               <a:pPr/>
-              <a:t>December 2, 2019</a:t>
+              <a:t>May 11, 2020</a:t>
             </a:fld>
             <a:endParaRPr lang="en-US" dirty="0"/>
           </a:p>
@@ -11724,7 +11724,7 @@
           <a:p>
             <a:fld id="{5958763E-B898-436D-883D-03711491D54A}" type="datetimeFigureOut">
               <a:rPr lang="en-US" smtClean="0"/>
-              <a:t>12/2/2019</a:t>
+              <a:t>5/11/2020</a:t>
             </a:fld>
             <a:endParaRPr lang="en-US"/>
           </a:p>
@@ -11855,7 +11855,7 @@
           <a:p>
             <a:fld id="{5958763E-B898-436D-883D-03711491D54A}" type="datetimeFigureOut">
               <a:rPr lang="en-US" smtClean="0"/>
-              <a:t>12/2/2019</a:t>
+              <a:t>5/11/2020</a:t>
             </a:fld>
             <a:endParaRPr lang="en-US"/>
           </a:p>
@@ -11986,7 +11986,7 @@
           <a:p>
             <a:fld id="{5958763E-B898-436D-883D-03711491D54A}" type="datetimeFigureOut">
               <a:rPr lang="en-US" smtClean="0"/>
-              <a:t>12/2/2019</a:t>
+              <a:t>5/11/2020</a:t>
             </a:fld>
             <a:endParaRPr lang="en-US"/>
           </a:p>
@@ -12117,7 +12117,7 @@
           <a:p>
             <a:fld id="{5958763E-B898-436D-883D-03711491D54A}" type="datetimeFigureOut">
               <a:rPr lang="en-US" smtClean="0"/>
-              <a:t>12/2/2019</a:t>
+              <a:t>5/11/2020</a:t>
             </a:fld>
             <a:endParaRPr lang="en-US"/>
           </a:p>
@@ -12248,7 +12248,7 @@
           <a:p>
             <a:fld id="{5958763E-B898-436D-883D-03711491D54A}" type="datetimeFigureOut">
               <a:rPr lang="en-US" smtClean="0"/>
-              <a:t>12/2/2019</a:t>
+              <a:t>5/11/2020</a:t>
             </a:fld>
             <a:endParaRPr lang="en-US"/>
           </a:p>
@@ -12379,7 +12379,7 @@
           <a:p>
             <a:fld id="{5958763E-B898-436D-883D-03711491D54A}" type="datetimeFigureOut">
               <a:rPr lang="en-US" smtClean="0"/>
-              <a:t>12/2/2019</a:t>
+              <a:t>5/11/2020</a:t>
             </a:fld>
             <a:endParaRPr lang="en-US"/>
           </a:p>
@@ -12510,7 +12510,7 @@
           <a:p>
             <a:fld id="{5958763E-B898-436D-883D-03711491D54A}" type="datetimeFigureOut">
               <a:rPr lang="en-US" smtClean="0"/>
-              <a:t>12/2/2019</a:t>
+              <a:t>5/11/2020</a:t>
             </a:fld>
             <a:endParaRPr lang="en-US"/>
           </a:p>
@@ -12641,7 +12641,7 @@
           <a:p>
             <a:fld id="{5958763E-B898-436D-883D-03711491D54A}" type="datetimeFigureOut">
               <a:rPr lang="en-US" smtClean="0"/>
-              <a:t>12/2/2019</a:t>
+              <a:t>5/11/2020</a:t>
             </a:fld>
             <a:endParaRPr lang="en-US"/>
           </a:p>
@@ -12781,7 +12781,7 @@
           <a:p>
             <a:fld id="{5958763E-B898-436D-883D-03711491D54A}" type="datetimeFigureOut">
               <a:rPr lang="en-US" smtClean="0"/>
-              <a:t>12/2/2019</a:t>
+              <a:t>5/11/2020</a:t>
             </a:fld>
             <a:endParaRPr lang="en-US"/>
           </a:p>
@@ -16142,7 +16142,7 @@
             <a:fld id="{1C2D31DE-C454-491C-B5C3-F097855E3DF7}" type="datetime4">
               <a:rPr lang="en-US" smtClean="0"/>
               <a:pPr/>
-              <a:t>December 2, 2019</a:t>
+              <a:t>May 11, 2020</a:t>
             </a:fld>
             <a:endParaRPr lang="en-US" dirty="0"/>
           </a:p>
@@ -28387,7 +28387,7 @@
           <a:p>
             <a:fld id="{5958763E-B898-436D-883D-03711491D54A}" type="datetimeFigureOut">
               <a:rPr lang="en-US" smtClean="0"/>
-              <a:t>12/2/2019</a:t>
+              <a:t>5/11/2020</a:t>
             </a:fld>
             <a:endParaRPr lang="en-US"/>
           </a:p>
@@ -28796,7 +28796,7 @@
           <a:p>
             <a:fld id="{5958763E-B898-436D-883D-03711491D54A}" type="datetimeFigureOut">
               <a:rPr lang="en-US" smtClean="0"/>
-              <a:t>12/2/2019</a:t>
+              <a:t>5/11/2020</a:t>
             </a:fld>
             <a:endParaRPr lang="en-US"/>
           </a:p>
@@ -29097,7 +29097,7 @@
           <a:p>
             <a:fld id="{5958763E-B898-436D-883D-03711491D54A}" type="datetimeFigureOut">
               <a:rPr lang="en-US" smtClean="0"/>
-              <a:t>12/2/2019</a:t>
+              <a:t>5/11/2020</a:t>
             </a:fld>
             <a:endParaRPr lang="en-US"/>
           </a:p>
@@ -29305,7 +29305,7 @@
           <a:p>
             <a:fld id="{5958763E-B898-436D-883D-03711491D54A}" type="datetimeFigureOut">
               <a:rPr lang="en-US" smtClean="0"/>
-              <a:t>12/2/2019</a:t>
+              <a:t>5/11/2020</a:t>
             </a:fld>
             <a:endParaRPr lang="en-US"/>
           </a:p>
@@ -29573,7 +29573,7 @@
           <a:p>
             <a:fld id="{5958763E-B898-436D-883D-03711491D54A}" type="datetimeFigureOut">
               <a:rPr lang="en-US" smtClean="0"/>
-              <a:t>12/2/2019</a:t>
+              <a:t>5/11/2020</a:t>
             </a:fld>
             <a:endParaRPr lang="en-US"/>
           </a:p>
@@ -30367,7 +30367,7 @@
           <a:p>
             <a:fld id="{5958763E-B898-436D-883D-03711491D54A}" type="datetimeFigureOut">
               <a:rPr lang="en-US" smtClean="0"/>
-              <a:t>12/2/2019</a:t>
+              <a:t>5/11/2020</a:t>
             </a:fld>
             <a:endParaRPr lang="en-US"/>
           </a:p>
@@ -30855,7 +30855,7 @@
           <a:p>
             <a:fld id="{5958763E-B898-436D-883D-03711491D54A}" type="datetimeFigureOut">
               <a:rPr lang="en-US" smtClean="0"/>
-              <a:t>12/2/2019</a:t>
+              <a:t>5/11/2020</a:t>
             </a:fld>
             <a:endParaRPr lang="en-US"/>
           </a:p>
@@ -31681,7 +31681,7 @@
           <a:p>
             <a:fld id="{5958763E-B898-436D-883D-03711491D54A}" type="datetimeFigureOut">
               <a:rPr lang="en-US" smtClean="0"/>
-              <a:t>12/2/2019</a:t>
+              <a:t>5/11/2020</a:t>
             </a:fld>
             <a:endParaRPr lang="en-US"/>
           </a:p>
@@ -31889,7 +31889,7 @@
           <a:p>
             <a:fld id="{5958763E-B898-436D-883D-03711491D54A}" type="datetimeFigureOut">
               <a:rPr lang="en-US" smtClean="0"/>
-              <a:t>12/2/2019</a:t>
+              <a:t>5/11/2020</a:t>
             </a:fld>
             <a:endParaRPr lang="en-US"/>
           </a:p>
@@ -32231,7 +32231,7 @@
           <a:p>
             <a:fld id="{5958763E-B898-436D-883D-03711491D54A}" type="datetimeFigureOut">
               <a:rPr lang="en-US" smtClean="0"/>
-              <a:t>12/2/2019</a:t>
+              <a:t>5/11/2020</a:t>
             </a:fld>
             <a:endParaRPr lang="en-US"/>
           </a:p>
@@ -32468,7 +32468,7 @@
           <a:p>
             <a:fld id="{5958763E-B898-436D-883D-03711491D54A}" type="datetimeFigureOut">
               <a:rPr lang="en-US" smtClean="0"/>
-              <a:t>12/2/2019</a:t>
+              <a:t>5/11/2020</a:t>
             </a:fld>
             <a:endParaRPr lang="en-US"/>
           </a:p>
@@ -32719,7 +32719,7 @@
           <a:p>
             <a:fld id="{5958763E-B898-436D-883D-03711491D54A}" type="datetimeFigureOut">
               <a:rPr lang="en-US" smtClean="0"/>
-              <a:t>12/2/2019</a:t>
+              <a:t>5/11/2020</a:t>
             </a:fld>
             <a:endParaRPr lang="en-US"/>
           </a:p>
@@ -36508,6 +36508,437 @@
   <p:transition>
     <p:fade/>
   </p:transition>
+  <p:timing>
+    <p:tnLst>
+      <p:par>
+        <p:cTn id="1" dur="indefinite" restart="never" nodeType="tmRoot">
+          <p:childTnLst>
+            <p:seq concurrent="1" nextAc="seek">
+              <p:cTn id="2" dur="indefinite" nodeType="mainSeq">
+                <p:childTnLst>
+                  <p:par>
+                    <p:cTn id="3" fill="hold">
+                      <p:stCondLst>
+                        <p:cond delay="indefinite"/>
+                      </p:stCondLst>
+                      <p:childTnLst>
+                        <p:par>
+                          <p:cTn id="4" fill="hold">
+                            <p:stCondLst>
+                              <p:cond delay="0"/>
+                            </p:stCondLst>
+                            <p:childTnLst>
+                              <p:par>
+                                <p:cTn id="5" presetID="10" presetClass="entr" presetSubtype="0" fill="hold" grpId="0" nodeType="clickEffect">
+                                  <p:stCondLst>
+                                    <p:cond delay="0"/>
+                                  </p:stCondLst>
+                                  <p:childTnLst>
+                                    <p:set>
+                                      <p:cBhvr>
+                                        <p:cTn id="6" dur="1" fill="hold">
+                                          <p:stCondLst>
+                                            <p:cond delay="0"/>
+                                          </p:stCondLst>
+                                        </p:cTn>
+                                        <p:tgtEl>
+                                          <p:spTgt spid="3">
+                                            <p:txEl>
+                                              <p:pRg st="0" end="0"/>
+                                            </p:txEl>
+                                          </p:spTgt>
+                                        </p:tgtEl>
+                                        <p:attrNameLst>
+                                          <p:attrName>style.visibility</p:attrName>
+                                        </p:attrNameLst>
+                                      </p:cBhvr>
+                                      <p:to>
+                                        <p:strVal val="visible"/>
+                                      </p:to>
+                                    </p:set>
+                                    <p:animEffect transition="in" filter="fade">
+                                      <p:cBhvr>
+                                        <p:cTn id="7" dur="500"/>
+                                        <p:tgtEl>
+                                          <p:spTgt spid="3">
+                                            <p:txEl>
+                                              <p:pRg st="0" end="0"/>
+                                            </p:txEl>
+                                          </p:spTgt>
+                                        </p:tgtEl>
+                                      </p:cBhvr>
+                                    </p:animEffect>
+                                  </p:childTnLst>
+                                </p:cTn>
+                              </p:par>
+                              <p:par>
+                                <p:cTn id="8" presetID="10" presetClass="entr" presetSubtype="0" fill="hold" grpId="0" nodeType="withEffect">
+                                  <p:stCondLst>
+                                    <p:cond delay="0"/>
+                                  </p:stCondLst>
+                                  <p:childTnLst>
+                                    <p:set>
+                                      <p:cBhvr>
+                                        <p:cTn id="9" dur="1" fill="hold">
+                                          <p:stCondLst>
+                                            <p:cond delay="0"/>
+                                          </p:stCondLst>
+                                        </p:cTn>
+                                        <p:tgtEl>
+                                          <p:spTgt spid="3">
+                                            <p:txEl>
+                                              <p:pRg st="1" end="1"/>
+                                            </p:txEl>
+                                          </p:spTgt>
+                                        </p:tgtEl>
+                                        <p:attrNameLst>
+                                          <p:attrName>style.visibility</p:attrName>
+                                        </p:attrNameLst>
+                                      </p:cBhvr>
+                                      <p:to>
+                                        <p:strVal val="visible"/>
+                                      </p:to>
+                                    </p:set>
+                                    <p:animEffect transition="in" filter="fade">
+                                      <p:cBhvr>
+                                        <p:cTn id="10" dur="500"/>
+                                        <p:tgtEl>
+                                          <p:spTgt spid="3">
+                                            <p:txEl>
+                                              <p:pRg st="1" end="1"/>
+                                            </p:txEl>
+                                          </p:spTgt>
+                                        </p:tgtEl>
+                                      </p:cBhvr>
+                                    </p:animEffect>
+                                  </p:childTnLst>
+                                </p:cTn>
+                              </p:par>
+                            </p:childTnLst>
+                          </p:cTn>
+                        </p:par>
+                      </p:childTnLst>
+                    </p:cTn>
+                  </p:par>
+                  <p:par>
+                    <p:cTn id="11" fill="hold">
+                      <p:stCondLst>
+                        <p:cond delay="indefinite"/>
+                      </p:stCondLst>
+                      <p:childTnLst>
+                        <p:par>
+                          <p:cTn id="12" fill="hold">
+                            <p:stCondLst>
+                              <p:cond delay="0"/>
+                            </p:stCondLst>
+                            <p:childTnLst>
+                              <p:par>
+                                <p:cTn id="13" presetID="10" presetClass="entr" presetSubtype="0" fill="hold" grpId="0" nodeType="clickEffect">
+                                  <p:stCondLst>
+                                    <p:cond delay="0"/>
+                                  </p:stCondLst>
+                                  <p:childTnLst>
+                                    <p:set>
+                                      <p:cBhvr>
+                                        <p:cTn id="14" dur="1" fill="hold">
+                                          <p:stCondLst>
+                                            <p:cond delay="0"/>
+                                          </p:stCondLst>
+                                        </p:cTn>
+                                        <p:tgtEl>
+                                          <p:spTgt spid="3">
+                                            <p:txEl>
+                                              <p:pRg st="2" end="2"/>
+                                            </p:txEl>
+                                          </p:spTgt>
+                                        </p:tgtEl>
+                                        <p:attrNameLst>
+                                          <p:attrName>style.visibility</p:attrName>
+                                        </p:attrNameLst>
+                                      </p:cBhvr>
+                                      <p:to>
+                                        <p:strVal val="visible"/>
+                                      </p:to>
+                                    </p:set>
+                                    <p:animEffect transition="in" filter="fade">
+                                      <p:cBhvr>
+                                        <p:cTn id="15" dur="500"/>
+                                        <p:tgtEl>
+                                          <p:spTgt spid="3">
+                                            <p:txEl>
+                                              <p:pRg st="2" end="2"/>
+                                            </p:txEl>
+                                          </p:spTgt>
+                                        </p:tgtEl>
+                                      </p:cBhvr>
+                                    </p:animEffect>
+                                  </p:childTnLst>
+                                </p:cTn>
+                              </p:par>
+                              <p:par>
+                                <p:cTn id="16" presetID="10" presetClass="entr" presetSubtype="0" fill="hold" grpId="0" nodeType="withEffect">
+                                  <p:stCondLst>
+                                    <p:cond delay="0"/>
+                                  </p:stCondLst>
+                                  <p:childTnLst>
+                                    <p:set>
+                                      <p:cBhvr>
+                                        <p:cTn id="17" dur="1" fill="hold">
+                                          <p:stCondLst>
+                                            <p:cond delay="0"/>
+                                          </p:stCondLst>
+                                        </p:cTn>
+                                        <p:tgtEl>
+                                          <p:spTgt spid="3">
+                                            <p:txEl>
+                                              <p:pRg st="3" end="3"/>
+                                            </p:txEl>
+                                          </p:spTgt>
+                                        </p:tgtEl>
+                                        <p:attrNameLst>
+                                          <p:attrName>style.visibility</p:attrName>
+                                        </p:attrNameLst>
+                                      </p:cBhvr>
+                                      <p:to>
+                                        <p:strVal val="visible"/>
+                                      </p:to>
+                                    </p:set>
+                                    <p:animEffect transition="in" filter="fade">
+                                      <p:cBhvr>
+                                        <p:cTn id="18" dur="500"/>
+                                        <p:tgtEl>
+                                          <p:spTgt spid="3">
+                                            <p:txEl>
+                                              <p:pRg st="3" end="3"/>
+                                            </p:txEl>
+                                          </p:spTgt>
+                                        </p:tgtEl>
+                                      </p:cBhvr>
+                                    </p:animEffect>
+                                  </p:childTnLst>
+                                </p:cTn>
+                              </p:par>
+                              <p:par>
+                                <p:cTn id="19" presetID="10" presetClass="entr" presetSubtype="0" fill="hold" grpId="0" nodeType="withEffect">
+                                  <p:stCondLst>
+                                    <p:cond delay="0"/>
+                                  </p:stCondLst>
+                                  <p:childTnLst>
+                                    <p:set>
+                                      <p:cBhvr>
+                                        <p:cTn id="20" dur="1" fill="hold">
+                                          <p:stCondLst>
+                                            <p:cond delay="0"/>
+                                          </p:stCondLst>
+                                        </p:cTn>
+                                        <p:tgtEl>
+                                          <p:spTgt spid="3">
+                                            <p:txEl>
+                                              <p:pRg st="4" end="4"/>
+                                            </p:txEl>
+                                          </p:spTgt>
+                                        </p:tgtEl>
+                                        <p:attrNameLst>
+                                          <p:attrName>style.visibility</p:attrName>
+                                        </p:attrNameLst>
+                                      </p:cBhvr>
+                                      <p:to>
+                                        <p:strVal val="visible"/>
+                                      </p:to>
+                                    </p:set>
+                                    <p:animEffect transition="in" filter="fade">
+                                      <p:cBhvr>
+                                        <p:cTn id="21" dur="500"/>
+                                        <p:tgtEl>
+                                          <p:spTgt spid="3">
+                                            <p:txEl>
+                                              <p:pRg st="4" end="4"/>
+                                            </p:txEl>
+                                          </p:spTgt>
+                                        </p:tgtEl>
+                                      </p:cBhvr>
+                                    </p:animEffect>
+                                  </p:childTnLst>
+                                </p:cTn>
+                              </p:par>
+                            </p:childTnLst>
+                          </p:cTn>
+                        </p:par>
+                      </p:childTnLst>
+                    </p:cTn>
+                  </p:par>
+                  <p:par>
+                    <p:cTn id="22" fill="hold">
+                      <p:stCondLst>
+                        <p:cond delay="indefinite"/>
+                      </p:stCondLst>
+                      <p:childTnLst>
+                        <p:par>
+                          <p:cTn id="23" fill="hold">
+                            <p:stCondLst>
+                              <p:cond delay="0"/>
+                            </p:stCondLst>
+                            <p:childTnLst>
+                              <p:par>
+                                <p:cTn id="24" presetID="10" presetClass="entr" presetSubtype="0" fill="hold" grpId="0" nodeType="clickEffect">
+                                  <p:stCondLst>
+                                    <p:cond delay="0"/>
+                                  </p:stCondLst>
+                                  <p:childTnLst>
+                                    <p:set>
+                                      <p:cBhvr>
+                                        <p:cTn id="25" dur="1" fill="hold">
+                                          <p:stCondLst>
+                                            <p:cond delay="0"/>
+                                          </p:stCondLst>
+                                        </p:cTn>
+                                        <p:tgtEl>
+                                          <p:spTgt spid="3">
+                                            <p:txEl>
+                                              <p:pRg st="5" end="5"/>
+                                            </p:txEl>
+                                          </p:spTgt>
+                                        </p:tgtEl>
+                                        <p:attrNameLst>
+                                          <p:attrName>style.visibility</p:attrName>
+                                        </p:attrNameLst>
+                                      </p:cBhvr>
+                                      <p:to>
+                                        <p:strVal val="visible"/>
+                                      </p:to>
+                                    </p:set>
+                                    <p:animEffect transition="in" filter="fade">
+                                      <p:cBhvr>
+                                        <p:cTn id="26" dur="500"/>
+                                        <p:tgtEl>
+                                          <p:spTgt spid="3">
+                                            <p:txEl>
+                                              <p:pRg st="5" end="5"/>
+                                            </p:txEl>
+                                          </p:spTgt>
+                                        </p:tgtEl>
+                                      </p:cBhvr>
+                                    </p:animEffect>
+                                  </p:childTnLst>
+                                </p:cTn>
+                              </p:par>
+                              <p:par>
+                                <p:cTn id="27" presetID="10" presetClass="entr" presetSubtype="0" fill="hold" grpId="0" nodeType="withEffect">
+                                  <p:stCondLst>
+                                    <p:cond delay="0"/>
+                                  </p:stCondLst>
+                                  <p:childTnLst>
+                                    <p:set>
+                                      <p:cBhvr>
+                                        <p:cTn id="28" dur="1" fill="hold">
+                                          <p:stCondLst>
+                                            <p:cond delay="0"/>
+                                          </p:stCondLst>
+                                        </p:cTn>
+                                        <p:tgtEl>
+                                          <p:spTgt spid="3">
+                                            <p:txEl>
+                                              <p:pRg st="6" end="6"/>
+                                            </p:txEl>
+                                          </p:spTgt>
+                                        </p:tgtEl>
+                                        <p:attrNameLst>
+                                          <p:attrName>style.visibility</p:attrName>
+                                        </p:attrNameLst>
+                                      </p:cBhvr>
+                                      <p:to>
+                                        <p:strVal val="visible"/>
+                                      </p:to>
+                                    </p:set>
+                                    <p:animEffect transition="in" filter="fade">
+                                      <p:cBhvr>
+                                        <p:cTn id="29" dur="500"/>
+                                        <p:tgtEl>
+                                          <p:spTgt spid="3">
+                                            <p:txEl>
+                                              <p:pRg st="6" end="6"/>
+                                            </p:txEl>
+                                          </p:spTgt>
+                                        </p:tgtEl>
+                                      </p:cBhvr>
+                                    </p:animEffect>
+                                  </p:childTnLst>
+                                </p:cTn>
+                              </p:par>
+                              <p:par>
+                                <p:cTn id="30" presetID="10" presetClass="entr" presetSubtype="0" fill="hold" grpId="0" nodeType="withEffect">
+                                  <p:stCondLst>
+                                    <p:cond delay="0"/>
+                                  </p:stCondLst>
+                                  <p:childTnLst>
+                                    <p:set>
+                                      <p:cBhvr>
+                                        <p:cTn id="31" dur="1" fill="hold">
+                                          <p:stCondLst>
+                                            <p:cond delay="0"/>
+                                          </p:stCondLst>
+                                        </p:cTn>
+                                        <p:tgtEl>
+                                          <p:spTgt spid="3">
+                                            <p:txEl>
+                                              <p:pRg st="7" end="7"/>
+                                            </p:txEl>
+                                          </p:spTgt>
+                                        </p:tgtEl>
+                                        <p:attrNameLst>
+                                          <p:attrName>style.visibility</p:attrName>
+                                        </p:attrNameLst>
+                                      </p:cBhvr>
+                                      <p:to>
+                                        <p:strVal val="visible"/>
+                                      </p:to>
+                                    </p:set>
+                                    <p:animEffect transition="in" filter="fade">
+                                      <p:cBhvr>
+                                        <p:cTn id="32" dur="500"/>
+                                        <p:tgtEl>
+                                          <p:spTgt spid="3">
+                                            <p:txEl>
+                                              <p:pRg st="7" end="7"/>
+                                            </p:txEl>
+                                          </p:spTgt>
+                                        </p:tgtEl>
+                                      </p:cBhvr>
+                                    </p:animEffect>
+                                  </p:childTnLst>
+                                </p:cTn>
+                              </p:par>
+                            </p:childTnLst>
+                          </p:cTn>
+                        </p:par>
+                      </p:childTnLst>
+                    </p:cTn>
+                  </p:par>
+                </p:childTnLst>
+              </p:cTn>
+              <p:prevCondLst>
+                <p:cond evt="onPrev" delay="0">
+                  <p:tgtEl>
+                    <p:sldTgt/>
+                  </p:tgtEl>
+                </p:cond>
+              </p:prevCondLst>
+              <p:nextCondLst>
+                <p:cond evt="onNext" delay="0">
+                  <p:tgtEl>
+                    <p:sldTgt/>
+                  </p:tgtEl>
+                </p:cond>
+              </p:nextCondLst>
+            </p:seq>
+          </p:childTnLst>
+        </p:cTn>
+      </p:par>
+    </p:tnLst>
+    <p:bldLst>
+      <p:bldP spid="3" grpId="0" build="p"/>
+    </p:bldLst>
+  </p:timing>
 </p:sld>
 </file>
 
@@ -36619,6 +37050,13 @@
   <p:transition>
     <p:fade/>
   </p:transition>
+  <p:timing>
+    <p:tnLst>
+      <p:par>
+        <p:cTn id="1" dur="indefinite" restart="never" nodeType="tmRoot"/>
+      </p:par>
+    </p:tnLst>
+  </p:timing>
 </p:sld>
 </file>
 
@@ -36742,6 +37180,13 @@
   <p:transition>
     <p:fade/>
   </p:transition>
+  <p:timing>
+    <p:tnLst>
+      <p:par>
+        <p:cTn id="1" dur="indefinite" restart="never" nodeType="tmRoot"/>
+      </p:par>
+    </p:tnLst>
+  </p:timing>
 </p:sld>
 </file>
 
@@ -36826,6 +37271,13 @@
   <p:transition>
     <p:fade/>
   </p:transition>
+  <p:timing>
+    <p:tnLst>
+      <p:par>
+        <p:cTn id="1" dur="indefinite" restart="never" nodeType="tmRoot"/>
+      </p:par>
+    </p:tnLst>
+  </p:timing>
 </p:sld>
 </file>
 
@@ -37044,6 +37496,222 @@
   <p:transition>
     <p:fade/>
   </p:transition>
+  <p:timing>
+    <p:tnLst>
+      <p:par>
+        <p:cTn id="1" dur="indefinite" restart="never" nodeType="tmRoot">
+          <p:childTnLst>
+            <p:seq concurrent="1" nextAc="seek">
+              <p:cTn id="2" dur="indefinite" nodeType="mainSeq">
+                <p:childTnLst>
+                  <p:par>
+                    <p:cTn id="3" fill="hold">
+                      <p:stCondLst>
+                        <p:cond delay="indefinite"/>
+                      </p:stCondLst>
+                      <p:childTnLst>
+                        <p:par>
+                          <p:cTn id="4" fill="hold">
+                            <p:stCondLst>
+                              <p:cond delay="0"/>
+                            </p:stCondLst>
+                            <p:childTnLst>
+                              <p:par>
+                                <p:cTn id="5" presetID="10" presetClass="entr" presetSubtype="0" fill="hold" grpId="0" nodeType="clickEffect">
+                                  <p:stCondLst>
+                                    <p:cond delay="0"/>
+                                  </p:stCondLst>
+                                  <p:childTnLst>
+                                    <p:set>
+                                      <p:cBhvr>
+                                        <p:cTn id="6" dur="1" fill="hold">
+                                          <p:stCondLst>
+                                            <p:cond delay="0"/>
+                                          </p:stCondLst>
+                                        </p:cTn>
+                                        <p:tgtEl>
+                                          <p:spTgt spid="3">
+                                            <p:txEl>
+                                              <p:pRg st="0" end="0"/>
+                                            </p:txEl>
+                                          </p:spTgt>
+                                        </p:tgtEl>
+                                        <p:attrNameLst>
+                                          <p:attrName>style.visibility</p:attrName>
+                                        </p:attrNameLst>
+                                      </p:cBhvr>
+                                      <p:to>
+                                        <p:strVal val="visible"/>
+                                      </p:to>
+                                    </p:set>
+                                    <p:animEffect transition="in" filter="fade">
+                                      <p:cBhvr>
+                                        <p:cTn id="7" dur="500"/>
+                                        <p:tgtEl>
+                                          <p:spTgt spid="3">
+                                            <p:txEl>
+                                              <p:pRg st="0" end="0"/>
+                                            </p:txEl>
+                                          </p:spTgt>
+                                        </p:tgtEl>
+                                      </p:cBhvr>
+                                    </p:animEffect>
+                                  </p:childTnLst>
+                                </p:cTn>
+                              </p:par>
+                            </p:childTnLst>
+                          </p:cTn>
+                        </p:par>
+                      </p:childTnLst>
+                    </p:cTn>
+                  </p:par>
+                  <p:par>
+                    <p:cTn id="8" fill="hold">
+                      <p:stCondLst>
+                        <p:cond delay="indefinite"/>
+                      </p:stCondLst>
+                      <p:childTnLst>
+                        <p:par>
+                          <p:cTn id="9" fill="hold">
+                            <p:stCondLst>
+                              <p:cond delay="0"/>
+                            </p:stCondLst>
+                            <p:childTnLst>
+                              <p:par>
+                                <p:cTn id="10" presetID="10" presetClass="entr" presetSubtype="0" fill="hold" grpId="0" nodeType="clickEffect">
+                                  <p:stCondLst>
+                                    <p:cond delay="0"/>
+                                  </p:stCondLst>
+                                  <p:childTnLst>
+                                    <p:set>
+                                      <p:cBhvr>
+                                        <p:cTn id="11" dur="1" fill="hold">
+                                          <p:stCondLst>
+                                            <p:cond delay="0"/>
+                                          </p:stCondLst>
+                                        </p:cTn>
+                                        <p:tgtEl>
+                                          <p:spTgt spid="3">
+                                            <p:txEl>
+                                              <p:pRg st="2" end="2"/>
+                                            </p:txEl>
+                                          </p:spTgt>
+                                        </p:tgtEl>
+                                        <p:attrNameLst>
+                                          <p:attrName>style.visibility</p:attrName>
+                                        </p:attrNameLst>
+                                      </p:cBhvr>
+                                      <p:to>
+                                        <p:strVal val="visible"/>
+                                      </p:to>
+                                    </p:set>
+                                    <p:animEffect transition="in" filter="fade">
+                                      <p:cBhvr>
+                                        <p:cTn id="12" dur="500"/>
+                                        <p:tgtEl>
+                                          <p:spTgt spid="3">
+                                            <p:txEl>
+                                              <p:pRg st="2" end="2"/>
+                                            </p:txEl>
+                                          </p:spTgt>
+                                        </p:tgtEl>
+                                      </p:cBhvr>
+                                    </p:animEffect>
+                                  </p:childTnLst>
+                                </p:cTn>
+                              </p:par>
+                            </p:childTnLst>
+                          </p:cTn>
+                        </p:par>
+                      </p:childTnLst>
+                    </p:cTn>
+                  </p:par>
+                  <p:par>
+                    <p:cTn id="13" fill="hold">
+                      <p:stCondLst>
+                        <p:cond delay="indefinite"/>
+                      </p:stCondLst>
+                      <p:childTnLst>
+                        <p:par>
+                          <p:cTn id="14" fill="hold">
+                            <p:stCondLst>
+                              <p:cond delay="0"/>
+                            </p:stCondLst>
+                            <p:childTnLst>
+                              <p:par>
+                                <p:cTn id="15" presetID="10" presetClass="entr" presetSubtype="0" fill="hold" grpId="0" nodeType="clickEffect">
+                                  <p:stCondLst>
+                                    <p:cond delay="0"/>
+                                  </p:stCondLst>
+                                  <p:childTnLst>
+                                    <p:set>
+                                      <p:cBhvr>
+                                        <p:cTn id="16" dur="1" fill="hold">
+                                          <p:stCondLst>
+                                            <p:cond delay="0"/>
+                                          </p:stCondLst>
+                                        </p:cTn>
+                                        <p:tgtEl>
+                                          <p:spTgt spid="3">
+                                            <p:txEl>
+                                              <p:pRg st="4" end="4"/>
+                                            </p:txEl>
+                                          </p:spTgt>
+                                        </p:tgtEl>
+                                        <p:attrNameLst>
+                                          <p:attrName>style.visibility</p:attrName>
+                                        </p:attrNameLst>
+                                      </p:cBhvr>
+                                      <p:to>
+                                        <p:strVal val="visible"/>
+                                      </p:to>
+                                    </p:set>
+                                    <p:animEffect transition="in" filter="fade">
+                                      <p:cBhvr>
+                                        <p:cTn id="17" dur="500"/>
+                                        <p:tgtEl>
+                                          <p:spTgt spid="3">
+                                            <p:txEl>
+                                              <p:pRg st="4" end="4"/>
+                                            </p:txEl>
+                                          </p:spTgt>
+                                        </p:tgtEl>
+                                      </p:cBhvr>
+                                    </p:animEffect>
+                                  </p:childTnLst>
+                                </p:cTn>
+                              </p:par>
+                            </p:childTnLst>
+                          </p:cTn>
+                        </p:par>
+                      </p:childTnLst>
+                    </p:cTn>
+                  </p:par>
+                </p:childTnLst>
+              </p:cTn>
+              <p:prevCondLst>
+                <p:cond evt="onPrev" delay="0">
+                  <p:tgtEl>
+                    <p:sldTgt/>
+                  </p:tgtEl>
+                </p:cond>
+              </p:prevCondLst>
+              <p:nextCondLst>
+                <p:cond evt="onNext" delay="0">
+                  <p:tgtEl>
+                    <p:sldTgt/>
+                  </p:tgtEl>
+                </p:cond>
+              </p:nextCondLst>
+            </p:seq>
+          </p:childTnLst>
+        </p:cTn>
+      </p:par>
+    </p:tnLst>
+    <p:bldLst>
+      <p:bldP spid="3" grpId="0" build="p"/>
+    </p:bldLst>
+  </p:timing>
 </p:sld>
 </file>
 
@@ -37193,9 +37861,218 @@
   <p:timing>
     <p:tnLst>
       <p:par>
-        <p:cTn id="1" dur="indefinite" restart="never" nodeType="tmRoot"/>
+        <p:cTn id="1" dur="indefinite" restart="never" nodeType="tmRoot">
+          <p:childTnLst>
+            <p:seq concurrent="1" nextAc="seek">
+              <p:cTn id="2" dur="indefinite" nodeType="mainSeq">
+                <p:childTnLst>
+                  <p:par>
+                    <p:cTn id="3" fill="hold">
+                      <p:stCondLst>
+                        <p:cond delay="indefinite"/>
+                      </p:stCondLst>
+                      <p:childTnLst>
+                        <p:par>
+                          <p:cTn id="4" fill="hold">
+                            <p:stCondLst>
+                              <p:cond delay="0"/>
+                            </p:stCondLst>
+                            <p:childTnLst>
+                              <p:par>
+                                <p:cTn id="5" presetID="10" presetClass="entr" presetSubtype="0" fill="hold" grpId="0" nodeType="clickEffect">
+                                  <p:stCondLst>
+                                    <p:cond delay="0"/>
+                                  </p:stCondLst>
+                                  <p:childTnLst>
+                                    <p:set>
+                                      <p:cBhvr>
+                                        <p:cTn id="6" dur="1" fill="hold">
+                                          <p:stCondLst>
+                                            <p:cond delay="0"/>
+                                          </p:stCondLst>
+                                        </p:cTn>
+                                        <p:tgtEl>
+                                          <p:spTgt spid="3">
+                                            <p:txEl>
+                                              <p:pRg st="1" end="1"/>
+                                            </p:txEl>
+                                          </p:spTgt>
+                                        </p:tgtEl>
+                                        <p:attrNameLst>
+                                          <p:attrName>style.visibility</p:attrName>
+                                        </p:attrNameLst>
+                                      </p:cBhvr>
+                                      <p:to>
+                                        <p:strVal val="visible"/>
+                                      </p:to>
+                                    </p:set>
+                                    <p:animEffect transition="in" filter="fade">
+                                      <p:cBhvr>
+                                        <p:cTn id="7" dur="500"/>
+                                        <p:tgtEl>
+                                          <p:spTgt spid="3">
+                                            <p:txEl>
+                                              <p:pRg st="1" end="1"/>
+                                            </p:txEl>
+                                          </p:spTgt>
+                                        </p:tgtEl>
+                                      </p:cBhvr>
+                                    </p:animEffect>
+                                  </p:childTnLst>
+                                </p:cTn>
+                              </p:par>
+                            </p:childTnLst>
+                          </p:cTn>
+                        </p:par>
+                      </p:childTnLst>
+                    </p:cTn>
+                  </p:par>
+                  <p:par>
+                    <p:cTn id="8" fill="hold">
+                      <p:stCondLst>
+                        <p:cond delay="indefinite"/>
+                      </p:stCondLst>
+                      <p:childTnLst>
+                        <p:par>
+                          <p:cTn id="9" fill="hold">
+                            <p:stCondLst>
+                              <p:cond delay="0"/>
+                            </p:stCondLst>
+                            <p:childTnLst>
+                              <p:par>
+                                <p:cTn id="10" presetID="10" presetClass="entr" presetSubtype="0" fill="hold" grpId="0" nodeType="clickEffect">
+                                  <p:stCondLst>
+                                    <p:cond delay="0"/>
+                                  </p:stCondLst>
+                                  <p:childTnLst>
+                                    <p:set>
+                                      <p:cBhvr>
+                                        <p:cTn id="11" dur="1" fill="hold">
+                                          <p:stCondLst>
+                                            <p:cond delay="0"/>
+                                          </p:stCondLst>
+                                        </p:cTn>
+                                        <p:tgtEl>
+                                          <p:spTgt spid="3">
+                                            <p:txEl>
+                                              <p:pRg st="3" end="3"/>
+                                            </p:txEl>
+                                          </p:spTgt>
+                                        </p:tgtEl>
+                                        <p:attrNameLst>
+                                          <p:attrName>style.visibility</p:attrName>
+                                        </p:attrNameLst>
+                                      </p:cBhvr>
+                                      <p:to>
+                                        <p:strVal val="visible"/>
+                                      </p:to>
+                                    </p:set>
+                                    <p:animEffect transition="in" filter="fade">
+                                      <p:cBhvr>
+                                        <p:cTn id="12" dur="500"/>
+                                        <p:tgtEl>
+                                          <p:spTgt spid="3">
+                                            <p:txEl>
+                                              <p:pRg st="3" end="3"/>
+                                            </p:txEl>
+                                          </p:spTgt>
+                                        </p:tgtEl>
+                                      </p:cBhvr>
+                                    </p:animEffect>
+                                  </p:childTnLst>
+                                </p:cTn>
+                              </p:par>
+                            </p:childTnLst>
+                          </p:cTn>
+                        </p:par>
+                      </p:childTnLst>
+                    </p:cTn>
+                  </p:par>
+                  <p:par>
+                    <p:cTn id="13" fill="hold">
+                      <p:stCondLst>
+                        <p:cond delay="indefinite"/>
+                      </p:stCondLst>
+                      <p:childTnLst>
+                        <p:par>
+                          <p:cTn id="14" fill="hold">
+                            <p:stCondLst>
+                              <p:cond delay="0"/>
+                            </p:stCondLst>
+                            <p:childTnLst>
+                              <p:par>
+                                <p:cTn id="15" presetID="10" presetClass="entr" presetSubtype="0" fill="hold" grpId="0" nodeType="clickEffect">
+                                  <p:stCondLst>
+                                    <p:cond delay="0"/>
+                                  </p:stCondLst>
+                                  <p:childTnLst>
+                                    <p:set>
+                                      <p:cBhvr>
+                                        <p:cTn id="16" dur="1" fill="hold">
+                                          <p:stCondLst>
+                                            <p:cond delay="0"/>
+                                          </p:stCondLst>
+                                        </p:cTn>
+                                        <p:tgtEl>
+                                          <p:spTgt spid="3">
+                                            <p:txEl>
+                                              <p:pRg st="5" end="5"/>
+                                            </p:txEl>
+                                          </p:spTgt>
+                                        </p:tgtEl>
+                                        <p:attrNameLst>
+                                          <p:attrName>style.visibility</p:attrName>
+                                        </p:attrNameLst>
+                                      </p:cBhvr>
+                                      <p:to>
+                                        <p:strVal val="visible"/>
+                                      </p:to>
+                                    </p:set>
+                                    <p:animEffect transition="in" filter="fade">
+                                      <p:cBhvr>
+                                        <p:cTn id="17" dur="500"/>
+                                        <p:tgtEl>
+                                          <p:spTgt spid="3">
+                                            <p:txEl>
+                                              <p:pRg st="5" end="5"/>
+                                            </p:txEl>
+                                          </p:spTgt>
+                                        </p:tgtEl>
+                                      </p:cBhvr>
+                                    </p:animEffect>
+                                  </p:childTnLst>
+                                </p:cTn>
+                              </p:par>
+                            </p:childTnLst>
+                          </p:cTn>
+                        </p:par>
+                      </p:childTnLst>
+                    </p:cTn>
+                  </p:par>
+                </p:childTnLst>
+              </p:cTn>
+              <p:prevCondLst>
+                <p:cond evt="onPrev" delay="0">
+                  <p:tgtEl>
+                    <p:sldTgt/>
+                  </p:tgtEl>
+                </p:cond>
+              </p:prevCondLst>
+              <p:nextCondLst>
+                <p:cond evt="onNext" delay="0">
+                  <p:tgtEl>
+                    <p:sldTgt/>
+                  </p:tgtEl>
+                </p:cond>
+              </p:nextCondLst>
+            </p:seq>
+          </p:childTnLst>
+        </p:cTn>
       </p:par>
     </p:tnLst>
+    <p:bldLst>
+      <p:bldP spid="3" grpId="0" build="p"/>
+    </p:bldLst>
   </p:timing>
 </p:sld>
 </file>
@@ -38458,7 +39335,15 @@
             </a:r>
             <a:r>
               <a:rPr lang="en-US" dirty="0"/>
-              <a:t> is a Windows folder, just like in File Explorer</a:t>
+              <a:t> is </a:t>
+            </a:r>
+            <a:r>
+              <a:rPr lang="en-US" dirty="0" smtClean="0"/>
+              <a:t>a folder</a:t>
+            </a:r>
+            <a:r>
+              <a:rPr lang="en-US" dirty="0"/>
+              <a:t>, just like in File Explorer</a:t>
             </a:r>
           </a:p>
           <a:p>
@@ -38557,6 +39442,394 @@
   <p:transition>
     <p:fade/>
   </p:transition>
+  <p:timing>
+    <p:tnLst>
+      <p:par>
+        <p:cTn id="1" dur="indefinite" restart="never" nodeType="tmRoot">
+          <p:childTnLst>
+            <p:seq concurrent="1" nextAc="seek">
+              <p:cTn id="2" dur="indefinite" nodeType="mainSeq">
+                <p:childTnLst>
+                  <p:par>
+                    <p:cTn id="3" fill="hold">
+                      <p:stCondLst>
+                        <p:cond delay="indefinite"/>
+                      </p:stCondLst>
+                      <p:childTnLst>
+                        <p:par>
+                          <p:cTn id="4" fill="hold">
+                            <p:stCondLst>
+                              <p:cond delay="0"/>
+                            </p:stCondLst>
+                            <p:childTnLst>
+                              <p:par>
+                                <p:cTn id="5" presetID="10" presetClass="entr" presetSubtype="0" fill="hold" grpId="0" nodeType="clickEffect">
+                                  <p:stCondLst>
+                                    <p:cond delay="0"/>
+                                  </p:stCondLst>
+                                  <p:childTnLst>
+                                    <p:set>
+                                      <p:cBhvr>
+                                        <p:cTn id="6" dur="1" fill="hold">
+                                          <p:stCondLst>
+                                            <p:cond delay="0"/>
+                                          </p:stCondLst>
+                                        </p:cTn>
+                                        <p:tgtEl>
+                                          <p:spTgt spid="3">
+                                            <p:txEl>
+                                              <p:pRg st="0" end="0"/>
+                                            </p:txEl>
+                                          </p:spTgt>
+                                        </p:tgtEl>
+                                        <p:attrNameLst>
+                                          <p:attrName>style.visibility</p:attrName>
+                                        </p:attrNameLst>
+                                      </p:cBhvr>
+                                      <p:to>
+                                        <p:strVal val="visible"/>
+                                      </p:to>
+                                    </p:set>
+                                    <p:animEffect transition="in" filter="fade">
+                                      <p:cBhvr>
+                                        <p:cTn id="7" dur="500"/>
+                                        <p:tgtEl>
+                                          <p:spTgt spid="3">
+                                            <p:txEl>
+                                              <p:pRg st="0" end="0"/>
+                                            </p:txEl>
+                                          </p:spTgt>
+                                        </p:tgtEl>
+                                      </p:cBhvr>
+                                    </p:animEffect>
+                                  </p:childTnLst>
+                                </p:cTn>
+                              </p:par>
+                              <p:par>
+                                <p:cTn id="8" presetID="10" presetClass="entr" presetSubtype="0" fill="hold" grpId="0" nodeType="withEffect">
+                                  <p:stCondLst>
+                                    <p:cond delay="0"/>
+                                  </p:stCondLst>
+                                  <p:childTnLst>
+                                    <p:set>
+                                      <p:cBhvr>
+                                        <p:cTn id="9" dur="1" fill="hold">
+                                          <p:stCondLst>
+                                            <p:cond delay="0"/>
+                                          </p:stCondLst>
+                                        </p:cTn>
+                                        <p:tgtEl>
+                                          <p:spTgt spid="3">
+                                            <p:txEl>
+                                              <p:pRg st="1" end="1"/>
+                                            </p:txEl>
+                                          </p:spTgt>
+                                        </p:tgtEl>
+                                        <p:attrNameLst>
+                                          <p:attrName>style.visibility</p:attrName>
+                                        </p:attrNameLst>
+                                      </p:cBhvr>
+                                      <p:to>
+                                        <p:strVal val="visible"/>
+                                      </p:to>
+                                    </p:set>
+                                    <p:animEffect transition="in" filter="fade">
+                                      <p:cBhvr>
+                                        <p:cTn id="10" dur="500"/>
+                                        <p:tgtEl>
+                                          <p:spTgt spid="3">
+                                            <p:txEl>
+                                              <p:pRg st="1" end="1"/>
+                                            </p:txEl>
+                                          </p:spTgt>
+                                        </p:tgtEl>
+                                      </p:cBhvr>
+                                    </p:animEffect>
+                                  </p:childTnLst>
+                                </p:cTn>
+                              </p:par>
+                            </p:childTnLst>
+                          </p:cTn>
+                        </p:par>
+                      </p:childTnLst>
+                    </p:cTn>
+                  </p:par>
+                  <p:par>
+                    <p:cTn id="11" fill="hold">
+                      <p:stCondLst>
+                        <p:cond delay="indefinite"/>
+                      </p:stCondLst>
+                      <p:childTnLst>
+                        <p:par>
+                          <p:cTn id="12" fill="hold">
+                            <p:stCondLst>
+                              <p:cond delay="0"/>
+                            </p:stCondLst>
+                            <p:childTnLst>
+                              <p:par>
+                                <p:cTn id="13" presetID="10" presetClass="entr" presetSubtype="0" fill="hold" grpId="0" nodeType="clickEffect">
+                                  <p:stCondLst>
+                                    <p:cond delay="0"/>
+                                  </p:stCondLst>
+                                  <p:childTnLst>
+                                    <p:set>
+                                      <p:cBhvr>
+                                        <p:cTn id="14" dur="1" fill="hold">
+                                          <p:stCondLst>
+                                            <p:cond delay="0"/>
+                                          </p:stCondLst>
+                                        </p:cTn>
+                                        <p:tgtEl>
+                                          <p:spTgt spid="3">
+                                            <p:txEl>
+                                              <p:pRg st="3" end="3"/>
+                                            </p:txEl>
+                                          </p:spTgt>
+                                        </p:tgtEl>
+                                        <p:attrNameLst>
+                                          <p:attrName>style.visibility</p:attrName>
+                                        </p:attrNameLst>
+                                      </p:cBhvr>
+                                      <p:to>
+                                        <p:strVal val="visible"/>
+                                      </p:to>
+                                    </p:set>
+                                    <p:animEffect transition="in" filter="fade">
+                                      <p:cBhvr>
+                                        <p:cTn id="15" dur="500"/>
+                                        <p:tgtEl>
+                                          <p:spTgt spid="3">
+                                            <p:txEl>
+                                              <p:pRg st="3" end="3"/>
+                                            </p:txEl>
+                                          </p:spTgt>
+                                        </p:tgtEl>
+                                      </p:cBhvr>
+                                    </p:animEffect>
+                                  </p:childTnLst>
+                                </p:cTn>
+                              </p:par>
+                              <p:par>
+                                <p:cTn id="16" presetID="10" presetClass="entr" presetSubtype="0" fill="hold" grpId="0" nodeType="withEffect">
+                                  <p:stCondLst>
+                                    <p:cond delay="0"/>
+                                  </p:stCondLst>
+                                  <p:childTnLst>
+                                    <p:set>
+                                      <p:cBhvr>
+                                        <p:cTn id="17" dur="1" fill="hold">
+                                          <p:stCondLst>
+                                            <p:cond delay="0"/>
+                                          </p:stCondLst>
+                                        </p:cTn>
+                                        <p:tgtEl>
+                                          <p:spTgt spid="3">
+                                            <p:txEl>
+                                              <p:pRg st="4" end="4"/>
+                                            </p:txEl>
+                                          </p:spTgt>
+                                        </p:tgtEl>
+                                        <p:attrNameLst>
+                                          <p:attrName>style.visibility</p:attrName>
+                                        </p:attrNameLst>
+                                      </p:cBhvr>
+                                      <p:to>
+                                        <p:strVal val="visible"/>
+                                      </p:to>
+                                    </p:set>
+                                    <p:animEffect transition="in" filter="fade">
+                                      <p:cBhvr>
+                                        <p:cTn id="18" dur="500"/>
+                                        <p:tgtEl>
+                                          <p:spTgt spid="3">
+                                            <p:txEl>
+                                              <p:pRg st="4" end="4"/>
+                                            </p:txEl>
+                                          </p:spTgt>
+                                        </p:tgtEl>
+                                      </p:cBhvr>
+                                    </p:animEffect>
+                                  </p:childTnLst>
+                                </p:cTn>
+                              </p:par>
+                            </p:childTnLst>
+                          </p:cTn>
+                        </p:par>
+                      </p:childTnLst>
+                    </p:cTn>
+                  </p:par>
+                  <p:par>
+                    <p:cTn id="19" fill="hold">
+                      <p:stCondLst>
+                        <p:cond delay="indefinite"/>
+                      </p:stCondLst>
+                      <p:childTnLst>
+                        <p:par>
+                          <p:cTn id="20" fill="hold">
+                            <p:stCondLst>
+                              <p:cond delay="0"/>
+                            </p:stCondLst>
+                            <p:childTnLst>
+                              <p:par>
+                                <p:cTn id="21" presetID="10" presetClass="entr" presetSubtype="0" fill="hold" grpId="0" nodeType="clickEffect">
+                                  <p:stCondLst>
+                                    <p:cond delay="0"/>
+                                  </p:stCondLst>
+                                  <p:childTnLst>
+                                    <p:set>
+                                      <p:cBhvr>
+                                        <p:cTn id="22" dur="1" fill="hold">
+                                          <p:stCondLst>
+                                            <p:cond delay="0"/>
+                                          </p:stCondLst>
+                                        </p:cTn>
+                                        <p:tgtEl>
+                                          <p:spTgt spid="3">
+                                            <p:txEl>
+                                              <p:pRg st="6" end="6"/>
+                                            </p:txEl>
+                                          </p:spTgt>
+                                        </p:tgtEl>
+                                        <p:attrNameLst>
+                                          <p:attrName>style.visibility</p:attrName>
+                                        </p:attrNameLst>
+                                      </p:cBhvr>
+                                      <p:to>
+                                        <p:strVal val="visible"/>
+                                      </p:to>
+                                    </p:set>
+                                    <p:animEffect transition="in" filter="fade">
+                                      <p:cBhvr>
+                                        <p:cTn id="23" dur="500"/>
+                                        <p:tgtEl>
+                                          <p:spTgt spid="3">
+                                            <p:txEl>
+                                              <p:pRg st="6" end="6"/>
+                                            </p:txEl>
+                                          </p:spTgt>
+                                        </p:tgtEl>
+                                      </p:cBhvr>
+                                    </p:animEffect>
+                                  </p:childTnLst>
+                                </p:cTn>
+                              </p:par>
+                              <p:par>
+                                <p:cTn id="24" presetID="10" presetClass="entr" presetSubtype="0" fill="hold" grpId="0" nodeType="withEffect">
+                                  <p:stCondLst>
+                                    <p:cond delay="0"/>
+                                  </p:stCondLst>
+                                  <p:childTnLst>
+                                    <p:set>
+                                      <p:cBhvr>
+                                        <p:cTn id="25" dur="1" fill="hold">
+                                          <p:stCondLst>
+                                            <p:cond delay="0"/>
+                                          </p:stCondLst>
+                                        </p:cTn>
+                                        <p:tgtEl>
+                                          <p:spTgt spid="3">
+                                            <p:txEl>
+                                              <p:pRg st="7" end="7"/>
+                                            </p:txEl>
+                                          </p:spTgt>
+                                        </p:tgtEl>
+                                        <p:attrNameLst>
+                                          <p:attrName>style.visibility</p:attrName>
+                                        </p:attrNameLst>
+                                      </p:cBhvr>
+                                      <p:to>
+                                        <p:strVal val="visible"/>
+                                      </p:to>
+                                    </p:set>
+                                    <p:animEffect transition="in" filter="fade">
+                                      <p:cBhvr>
+                                        <p:cTn id="26" dur="500"/>
+                                        <p:tgtEl>
+                                          <p:spTgt spid="3">
+                                            <p:txEl>
+                                              <p:pRg st="7" end="7"/>
+                                            </p:txEl>
+                                          </p:spTgt>
+                                        </p:tgtEl>
+                                      </p:cBhvr>
+                                    </p:animEffect>
+                                  </p:childTnLst>
+                                </p:cTn>
+                              </p:par>
+                              <p:par>
+                                <p:cTn id="27" presetID="10" presetClass="entr" presetSubtype="0" fill="hold" grpId="0" nodeType="withEffect">
+                                  <p:stCondLst>
+                                    <p:cond delay="0"/>
+                                  </p:stCondLst>
+                                  <p:childTnLst>
+                                    <p:set>
+                                      <p:cBhvr>
+                                        <p:cTn id="28" dur="1" fill="hold">
+                                          <p:stCondLst>
+                                            <p:cond delay="0"/>
+                                          </p:stCondLst>
+                                        </p:cTn>
+                                        <p:tgtEl>
+                                          <p:spTgt spid="3">
+                                            <p:txEl>
+                                              <p:pRg st="8" end="8"/>
+                                            </p:txEl>
+                                          </p:spTgt>
+                                        </p:tgtEl>
+                                        <p:attrNameLst>
+                                          <p:attrName>style.visibility</p:attrName>
+                                        </p:attrNameLst>
+                                      </p:cBhvr>
+                                      <p:to>
+                                        <p:strVal val="visible"/>
+                                      </p:to>
+                                    </p:set>
+                                    <p:animEffect transition="in" filter="fade">
+                                      <p:cBhvr>
+                                        <p:cTn id="29" dur="500"/>
+                                        <p:tgtEl>
+                                          <p:spTgt spid="3">
+                                            <p:txEl>
+                                              <p:pRg st="8" end="8"/>
+                                            </p:txEl>
+                                          </p:spTgt>
+                                        </p:tgtEl>
+                                      </p:cBhvr>
+                                    </p:animEffect>
+                                  </p:childTnLst>
+                                </p:cTn>
+                              </p:par>
+                            </p:childTnLst>
+                          </p:cTn>
+                        </p:par>
+                      </p:childTnLst>
+                    </p:cTn>
+                  </p:par>
+                </p:childTnLst>
+              </p:cTn>
+              <p:prevCondLst>
+                <p:cond evt="onPrev" delay="0">
+                  <p:tgtEl>
+                    <p:sldTgt/>
+                  </p:tgtEl>
+                </p:cond>
+              </p:prevCondLst>
+              <p:nextCondLst>
+                <p:cond evt="onNext" delay="0">
+                  <p:tgtEl>
+                    <p:sldTgt/>
+                  </p:tgtEl>
+                </p:cond>
+              </p:nextCondLst>
+            </p:seq>
+          </p:childTnLst>
+        </p:cTn>
+      </p:par>
+    </p:tnLst>
+    <p:bldLst>
+      <p:bldP spid="3" grpId="0" build="p"/>
+    </p:bldLst>
+  </p:timing>
 </p:sld>
 </file>
 
@@ -38881,6 +40154,13 @@
   <p:transition>
     <p:fade/>
   </p:transition>
+  <p:timing>
+    <p:tnLst>
+      <p:par>
+        <p:cTn id="1" dur="indefinite" restart="never" nodeType="tmRoot"/>
+      </p:par>
+    </p:tnLst>
+  </p:timing>
 </p:sld>
 </file>
 

</xml_diff>

<commit_message>
Deploy hytechclub/web-201 to github.com/hytechclub/web-201.git:gh-pages
</commit_message>
<xml_diff>
--- a/CommandLine/CommandLine.pptx
+++ b/CommandLine/CommandLine.pptx
@@ -219,7 +219,7 @@
           <a:p>
             <a:fld id="{19104133-B5B0-4351-8158-4F0E5EB1E2BF}" type="datetimeFigureOut">
               <a:rPr lang="en-US" smtClean="0"/>
-              <a:t>12/2/2019</a:t>
+              <a:t>5/11/2020</a:t>
             </a:fld>
             <a:endParaRPr lang="en-US"/>
           </a:p>
@@ -1113,7 +1113,7 @@
             <a:fld id="{1C2D31DE-C454-491C-B5C3-F097855E3DF7}" type="datetime4">
               <a:rPr lang="en-US" smtClean="0"/>
               <a:pPr/>
-              <a:t>December 2, 2019</a:t>
+              <a:t>May 11, 2020</a:t>
             </a:fld>
             <a:endParaRPr lang="en-US" dirty="0"/>
           </a:p>
@@ -4513,7 +4513,7 @@
           <a:p>
             <a:fld id="{5958763E-B898-436D-883D-03711491D54A}" type="datetimeFigureOut">
               <a:rPr lang="en-US" smtClean="0"/>
-              <a:t>12/2/2019</a:t>
+              <a:t>5/11/2020</a:t>
             </a:fld>
             <a:endParaRPr lang="en-US"/>
           </a:p>
@@ -4714,7 +4714,7 @@
           <a:p>
             <a:fld id="{5958763E-B898-436D-883D-03711491D54A}" type="datetimeFigureOut">
               <a:rPr lang="en-US" smtClean="0"/>
-              <a:t>12/2/2019</a:t>
+              <a:t>5/11/2020</a:t>
             </a:fld>
             <a:endParaRPr lang="en-US"/>
           </a:p>
@@ -4971,7 +4971,7 @@
           <a:p>
             <a:fld id="{5958763E-B898-436D-883D-03711491D54A}" type="datetimeFigureOut">
               <a:rPr lang="en-US" smtClean="0"/>
-              <a:t>12/2/2019</a:t>
+              <a:t>5/11/2020</a:t>
             </a:fld>
             <a:endParaRPr lang="en-US"/>
           </a:p>
@@ -5326,7 +5326,7 @@
           <a:p>
             <a:fld id="{5958763E-B898-436D-883D-03711491D54A}" type="datetimeFigureOut">
               <a:rPr lang="en-US" smtClean="0"/>
-              <a:t>12/2/2019</a:t>
+              <a:t>5/11/2020</a:t>
             </a:fld>
             <a:endParaRPr lang="en-US"/>
           </a:p>
@@ -5749,7 +5749,7 @@
           <a:p>
             <a:fld id="{5958763E-B898-436D-883D-03711491D54A}" type="datetimeFigureOut">
               <a:rPr lang="en-US" smtClean="0"/>
-              <a:t>12/2/2019</a:t>
+              <a:t>5/11/2020</a:t>
             </a:fld>
             <a:endParaRPr lang="en-US"/>
           </a:p>
@@ -6257,7 +6257,7 @@
           <a:p>
             <a:fld id="{5958763E-B898-436D-883D-03711491D54A}" type="datetimeFigureOut">
               <a:rPr lang="en-US" smtClean="0"/>
-              <a:t>12/2/2019</a:t>
+              <a:t>5/11/2020</a:t>
             </a:fld>
             <a:endParaRPr lang="en-US"/>
           </a:p>
@@ -6715,7 +6715,7 @@
           <a:p>
             <a:fld id="{5958763E-B898-436D-883D-03711491D54A}" type="datetimeFigureOut">
               <a:rPr lang="en-US" smtClean="0"/>
-              <a:t>12/2/2019</a:t>
+              <a:t>5/11/2020</a:t>
             </a:fld>
             <a:endParaRPr lang="en-US"/>
           </a:p>
@@ -7333,7 +7333,7 @@
           <a:p>
             <a:fld id="{5958763E-B898-436D-883D-03711491D54A}" type="datetimeFigureOut">
               <a:rPr lang="en-US" smtClean="0"/>
-              <a:t>12/2/2019</a:t>
+              <a:t>5/11/2020</a:t>
             </a:fld>
             <a:endParaRPr lang="en-US"/>
           </a:p>
@@ -8111,7 +8111,7 @@
           <a:p>
             <a:fld id="{5958763E-B898-436D-883D-03711491D54A}" type="datetimeFigureOut">
               <a:rPr lang="en-US" smtClean="0"/>
-              <a:t>12/2/2019</a:t>
+              <a:t>5/11/2020</a:t>
             </a:fld>
             <a:endParaRPr lang="en-US"/>
           </a:p>
@@ -8222,7 +8222,7 @@
           <a:p>
             <a:fld id="{5958763E-B898-436D-883D-03711491D54A}" type="datetimeFigureOut">
               <a:rPr lang="en-US" smtClean="0"/>
-              <a:t>12/2/2019</a:t>
+              <a:t>5/11/2020</a:t>
             </a:fld>
             <a:endParaRPr lang="en-US"/>
           </a:p>
@@ -8564,7 +8564,7 @@
             <a:fld id="{1C2D31DE-C454-491C-B5C3-F097855E3DF7}" type="datetime4">
               <a:rPr lang="en-US" smtClean="0"/>
               <a:pPr/>
-              <a:t>December 2, 2019</a:t>
+              <a:t>May 11, 2020</a:t>
             </a:fld>
             <a:endParaRPr lang="en-US" dirty="0"/>
           </a:p>
@@ -11724,7 +11724,7 @@
           <a:p>
             <a:fld id="{5958763E-B898-436D-883D-03711491D54A}" type="datetimeFigureOut">
               <a:rPr lang="en-US" smtClean="0"/>
-              <a:t>12/2/2019</a:t>
+              <a:t>5/11/2020</a:t>
             </a:fld>
             <a:endParaRPr lang="en-US"/>
           </a:p>
@@ -11855,7 +11855,7 @@
           <a:p>
             <a:fld id="{5958763E-B898-436D-883D-03711491D54A}" type="datetimeFigureOut">
               <a:rPr lang="en-US" smtClean="0"/>
-              <a:t>12/2/2019</a:t>
+              <a:t>5/11/2020</a:t>
             </a:fld>
             <a:endParaRPr lang="en-US"/>
           </a:p>
@@ -11986,7 +11986,7 @@
           <a:p>
             <a:fld id="{5958763E-B898-436D-883D-03711491D54A}" type="datetimeFigureOut">
               <a:rPr lang="en-US" smtClean="0"/>
-              <a:t>12/2/2019</a:t>
+              <a:t>5/11/2020</a:t>
             </a:fld>
             <a:endParaRPr lang="en-US"/>
           </a:p>
@@ -12117,7 +12117,7 @@
           <a:p>
             <a:fld id="{5958763E-B898-436D-883D-03711491D54A}" type="datetimeFigureOut">
               <a:rPr lang="en-US" smtClean="0"/>
-              <a:t>12/2/2019</a:t>
+              <a:t>5/11/2020</a:t>
             </a:fld>
             <a:endParaRPr lang="en-US"/>
           </a:p>
@@ -12248,7 +12248,7 @@
           <a:p>
             <a:fld id="{5958763E-B898-436D-883D-03711491D54A}" type="datetimeFigureOut">
               <a:rPr lang="en-US" smtClean="0"/>
-              <a:t>12/2/2019</a:t>
+              <a:t>5/11/2020</a:t>
             </a:fld>
             <a:endParaRPr lang="en-US"/>
           </a:p>
@@ -12379,7 +12379,7 @@
           <a:p>
             <a:fld id="{5958763E-B898-436D-883D-03711491D54A}" type="datetimeFigureOut">
               <a:rPr lang="en-US" smtClean="0"/>
-              <a:t>12/2/2019</a:t>
+              <a:t>5/11/2020</a:t>
             </a:fld>
             <a:endParaRPr lang="en-US"/>
           </a:p>
@@ -12510,7 +12510,7 @@
           <a:p>
             <a:fld id="{5958763E-B898-436D-883D-03711491D54A}" type="datetimeFigureOut">
               <a:rPr lang="en-US" smtClean="0"/>
-              <a:t>12/2/2019</a:t>
+              <a:t>5/11/2020</a:t>
             </a:fld>
             <a:endParaRPr lang="en-US"/>
           </a:p>
@@ -12641,7 +12641,7 @@
           <a:p>
             <a:fld id="{5958763E-B898-436D-883D-03711491D54A}" type="datetimeFigureOut">
               <a:rPr lang="en-US" smtClean="0"/>
-              <a:t>12/2/2019</a:t>
+              <a:t>5/11/2020</a:t>
             </a:fld>
             <a:endParaRPr lang="en-US"/>
           </a:p>
@@ -12781,7 +12781,7 @@
           <a:p>
             <a:fld id="{5958763E-B898-436D-883D-03711491D54A}" type="datetimeFigureOut">
               <a:rPr lang="en-US" smtClean="0"/>
-              <a:t>12/2/2019</a:t>
+              <a:t>5/11/2020</a:t>
             </a:fld>
             <a:endParaRPr lang="en-US"/>
           </a:p>
@@ -16142,7 +16142,7 @@
             <a:fld id="{1C2D31DE-C454-491C-B5C3-F097855E3DF7}" type="datetime4">
               <a:rPr lang="en-US" smtClean="0"/>
               <a:pPr/>
-              <a:t>December 2, 2019</a:t>
+              <a:t>May 11, 2020</a:t>
             </a:fld>
             <a:endParaRPr lang="en-US" dirty="0"/>
           </a:p>
@@ -28387,7 +28387,7 @@
           <a:p>
             <a:fld id="{5958763E-B898-436D-883D-03711491D54A}" type="datetimeFigureOut">
               <a:rPr lang="en-US" smtClean="0"/>
-              <a:t>12/2/2019</a:t>
+              <a:t>5/11/2020</a:t>
             </a:fld>
             <a:endParaRPr lang="en-US"/>
           </a:p>
@@ -28796,7 +28796,7 @@
           <a:p>
             <a:fld id="{5958763E-B898-436D-883D-03711491D54A}" type="datetimeFigureOut">
               <a:rPr lang="en-US" smtClean="0"/>
-              <a:t>12/2/2019</a:t>
+              <a:t>5/11/2020</a:t>
             </a:fld>
             <a:endParaRPr lang="en-US"/>
           </a:p>
@@ -29097,7 +29097,7 @@
           <a:p>
             <a:fld id="{5958763E-B898-436D-883D-03711491D54A}" type="datetimeFigureOut">
               <a:rPr lang="en-US" smtClean="0"/>
-              <a:t>12/2/2019</a:t>
+              <a:t>5/11/2020</a:t>
             </a:fld>
             <a:endParaRPr lang="en-US"/>
           </a:p>
@@ -29305,7 +29305,7 @@
           <a:p>
             <a:fld id="{5958763E-B898-436D-883D-03711491D54A}" type="datetimeFigureOut">
               <a:rPr lang="en-US" smtClean="0"/>
-              <a:t>12/2/2019</a:t>
+              <a:t>5/11/2020</a:t>
             </a:fld>
             <a:endParaRPr lang="en-US"/>
           </a:p>
@@ -29573,7 +29573,7 @@
           <a:p>
             <a:fld id="{5958763E-B898-436D-883D-03711491D54A}" type="datetimeFigureOut">
               <a:rPr lang="en-US" smtClean="0"/>
-              <a:t>12/2/2019</a:t>
+              <a:t>5/11/2020</a:t>
             </a:fld>
             <a:endParaRPr lang="en-US"/>
           </a:p>
@@ -30367,7 +30367,7 @@
           <a:p>
             <a:fld id="{5958763E-B898-436D-883D-03711491D54A}" type="datetimeFigureOut">
               <a:rPr lang="en-US" smtClean="0"/>
-              <a:t>12/2/2019</a:t>
+              <a:t>5/11/2020</a:t>
             </a:fld>
             <a:endParaRPr lang="en-US"/>
           </a:p>
@@ -30855,7 +30855,7 @@
           <a:p>
             <a:fld id="{5958763E-B898-436D-883D-03711491D54A}" type="datetimeFigureOut">
               <a:rPr lang="en-US" smtClean="0"/>
-              <a:t>12/2/2019</a:t>
+              <a:t>5/11/2020</a:t>
             </a:fld>
             <a:endParaRPr lang="en-US"/>
           </a:p>
@@ -31681,7 +31681,7 @@
           <a:p>
             <a:fld id="{5958763E-B898-436D-883D-03711491D54A}" type="datetimeFigureOut">
               <a:rPr lang="en-US" smtClean="0"/>
-              <a:t>12/2/2019</a:t>
+              <a:t>5/11/2020</a:t>
             </a:fld>
             <a:endParaRPr lang="en-US"/>
           </a:p>
@@ -31889,7 +31889,7 @@
           <a:p>
             <a:fld id="{5958763E-B898-436D-883D-03711491D54A}" type="datetimeFigureOut">
               <a:rPr lang="en-US" smtClean="0"/>
-              <a:t>12/2/2019</a:t>
+              <a:t>5/11/2020</a:t>
             </a:fld>
             <a:endParaRPr lang="en-US"/>
           </a:p>
@@ -32231,7 +32231,7 @@
           <a:p>
             <a:fld id="{5958763E-B898-436D-883D-03711491D54A}" type="datetimeFigureOut">
               <a:rPr lang="en-US" smtClean="0"/>
-              <a:t>12/2/2019</a:t>
+              <a:t>5/11/2020</a:t>
             </a:fld>
             <a:endParaRPr lang="en-US"/>
           </a:p>
@@ -32468,7 +32468,7 @@
           <a:p>
             <a:fld id="{5958763E-B898-436D-883D-03711491D54A}" type="datetimeFigureOut">
               <a:rPr lang="en-US" smtClean="0"/>
-              <a:t>12/2/2019</a:t>
+              <a:t>5/11/2020</a:t>
             </a:fld>
             <a:endParaRPr lang="en-US"/>
           </a:p>
@@ -32719,7 +32719,7 @@
           <a:p>
             <a:fld id="{5958763E-B898-436D-883D-03711491D54A}" type="datetimeFigureOut">
               <a:rPr lang="en-US" smtClean="0"/>
-              <a:t>12/2/2019</a:t>
+              <a:t>5/11/2020</a:t>
             </a:fld>
             <a:endParaRPr lang="en-US"/>
           </a:p>
@@ -36508,6 +36508,437 @@
   <p:transition>
     <p:fade/>
   </p:transition>
+  <p:timing>
+    <p:tnLst>
+      <p:par>
+        <p:cTn id="1" dur="indefinite" restart="never" nodeType="tmRoot">
+          <p:childTnLst>
+            <p:seq concurrent="1" nextAc="seek">
+              <p:cTn id="2" dur="indefinite" nodeType="mainSeq">
+                <p:childTnLst>
+                  <p:par>
+                    <p:cTn id="3" fill="hold">
+                      <p:stCondLst>
+                        <p:cond delay="indefinite"/>
+                      </p:stCondLst>
+                      <p:childTnLst>
+                        <p:par>
+                          <p:cTn id="4" fill="hold">
+                            <p:stCondLst>
+                              <p:cond delay="0"/>
+                            </p:stCondLst>
+                            <p:childTnLst>
+                              <p:par>
+                                <p:cTn id="5" presetID="10" presetClass="entr" presetSubtype="0" fill="hold" grpId="0" nodeType="clickEffect">
+                                  <p:stCondLst>
+                                    <p:cond delay="0"/>
+                                  </p:stCondLst>
+                                  <p:childTnLst>
+                                    <p:set>
+                                      <p:cBhvr>
+                                        <p:cTn id="6" dur="1" fill="hold">
+                                          <p:stCondLst>
+                                            <p:cond delay="0"/>
+                                          </p:stCondLst>
+                                        </p:cTn>
+                                        <p:tgtEl>
+                                          <p:spTgt spid="3">
+                                            <p:txEl>
+                                              <p:pRg st="0" end="0"/>
+                                            </p:txEl>
+                                          </p:spTgt>
+                                        </p:tgtEl>
+                                        <p:attrNameLst>
+                                          <p:attrName>style.visibility</p:attrName>
+                                        </p:attrNameLst>
+                                      </p:cBhvr>
+                                      <p:to>
+                                        <p:strVal val="visible"/>
+                                      </p:to>
+                                    </p:set>
+                                    <p:animEffect transition="in" filter="fade">
+                                      <p:cBhvr>
+                                        <p:cTn id="7" dur="500"/>
+                                        <p:tgtEl>
+                                          <p:spTgt spid="3">
+                                            <p:txEl>
+                                              <p:pRg st="0" end="0"/>
+                                            </p:txEl>
+                                          </p:spTgt>
+                                        </p:tgtEl>
+                                      </p:cBhvr>
+                                    </p:animEffect>
+                                  </p:childTnLst>
+                                </p:cTn>
+                              </p:par>
+                              <p:par>
+                                <p:cTn id="8" presetID="10" presetClass="entr" presetSubtype="0" fill="hold" grpId="0" nodeType="withEffect">
+                                  <p:stCondLst>
+                                    <p:cond delay="0"/>
+                                  </p:stCondLst>
+                                  <p:childTnLst>
+                                    <p:set>
+                                      <p:cBhvr>
+                                        <p:cTn id="9" dur="1" fill="hold">
+                                          <p:stCondLst>
+                                            <p:cond delay="0"/>
+                                          </p:stCondLst>
+                                        </p:cTn>
+                                        <p:tgtEl>
+                                          <p:spTgt spid="3">
+                                            <p:txEl>
+                                              <p:pRg st="1" end="1"/>
+                                            </p:txEl>
+                                          </p:spTgt>
+                                        </p:tgtEl>
+                                        <p:attrNameLst>
+                                          <p:attrName>style.visibility</p:attrName>
+                                        </p:attrNameLst>
+                                      </p:cBhvr>
+                                      <p:to>
+                                        <p:strVal val="visible"/>
+                                      </p:to>
+                                    </p:set>
+                                    <p:animEffect transition="in" filter="fade">
+                                      <p:cBhvr>
+                                        <p:cTn id="10" dur="500"/>
+                                        <p:tgtEl>
+                                          <p:spTgt spid="3">
+                                            <p:txEl>
+                                              <p:pRg st="1" end="1"/>
+                                            </p:txEl>
+                                          </p:spTgt>
+                                        </p:tgtEl>
+                                      </p:cBhvr>
+                                    </p:animEffect>
+                                  </p:childTnLst>
+                                </p:cTn>
+                              </p:par>
+                            </p:childTnLst>
+                          </p:cTn>
+                        </p:par>
+                      </p:childTnLst>
+                    </p:cTn>
+                  </p:par>
+                  <p:par>
+                    <p:cTn id="11" fill="hold">
+                      <p:stCondLst>
+                        <p:cond delay="indefinite"/>
+                      </p:stCondLst>
+                      <p:childTnLst>
+                        <p:par>
+                          <p:cTn id="12" fill="hold">
+                            <p:stCondLst>
+                              <p:cond delay="0"/>
+                            </p:stCondLst>
+                            <p:childTnLst>
+                              <p:par>
+                                <p:cTn id="13" presetID="10" presetClass="entr" presetSubtype="0" fill="hold" grpId="0" nodeType="clickEffect">
+                                  <p:stCondLst>
+                                    <p:cond delay="0"/>
+                                  </p:stCondLst>
+                                  <p:childTnLst>
+                                    <p:set>
+                                      <p:cBhvr>
+                                        <p:cTn id="14" dur="1" fill="hold">
+                                          <p:stCondLst>
+                                            <p:cond delay="0"/>
+                                          </p:stCondLst>
+                                        </p:cTn>
+                                        <p:tgtEl>
+                                          <p:spTgt spid="3">
+                                            <p:txEl>
+                                              <p:pRg st="2" end="2"/>
+                                            </p:txEl>
+                                          </p:spTgt>
+                                        </p:tgtEl>
+                                        <p:attrNameLst>
+                                          <p:attrName>style.visibility</p:attrName>
+                                        </p:attrNameLst>
+                                      </p:cBhvr>
+                                      <p:to>
+                                        <p:strVal val="visible"/>
+                                      </p:to>
+                                    </p:set>
+                                    <p:animEffect transition="in" filter="fade">
+                                      <p:cBhvr>
+                                        <p:cTn id="15" dur="500"/>
+                                        <p:tgtEl>
+                                          <p:spTgt spid="3">
+                                            <p:txEl>
+                                              <p:pRg st="2" end="2"/>
+                                            </p:txEl>
+                                          </p:spTgt>
+                                        </p:tgtEl>
+                                      </p:cBhvr>
+                                    </p:animEffect>
+                                  </p:childTnLst>
+                                </p:cTn>
+                              </p:par>
+                              <p:par>
+                                <p:cTn id="16" presetID="10" presetClass="entr" presetSubtype="0" fill="hold" grpId="0" nodeType="withEffect">
+                                  <p:stCondLst>
+                                    <p:cond delay="0"/>
+                                  </p:stCondLst>
+                                  <p:childTnLst>
+                                    <p:set>
+                                      <p:cBhvr>
+                                        <p:cTn id="17" dur="1" fill="hold">
+                                          <p:stCondLst>
+                                            <p:cond delay="0"/>
+                                          </p:stCondLst>
+                                        </p:cTn>
+                                        <p:tgtEl>
+                                          <p:spTgt spid="3">
+                                            <p:txEl>
+                                              <p:pRg st="3" end="3"/>
+                                            </p:txEl>
+                                          </p:spTgt>
+                                        </p:tgtEl>
+                                        <p:attrNameLst>
+                                          <p:attrName>style.visibility</p:attrName>
+                                        </p:attrNameLst>
+                                      </p:cBhvr>
+                                      <p:to>
+                                        <p:strVal val="visible"/>
+                                      </p:to>
+                                    </p:set>
+                                    <p:animEffect transition="in" filter="fade">
+                                      <p:cBhvr>
+                                        <p:cTn id="18" dur="500"/>
+                                        <p:tgtEl>
+                                          <p:spTgt spid="3">
+                                            <p:txEl>
+                                              <p:pRg st="3" end="3"/>
+                                            </p:txEl>
+                                          </p:spTgt>
+                                        </p:tgtEl>
+                                      </p:cBhvr>
+                                    </p:animEffect>
+                                  </p:childTnLst>
+                                </p:cTn>
+                              </p:par>
+                              <p:par>
+                                <p:cTn id="19" presetID="10" presetClass="entr" presetSubtype="0" fill="hold" grpId="0" nodeType="withEffect">
+                                  <p:stCondLst>
+                                    <p:cond delay="0"/>
+                                  </p:stCondLst>
+                                  <p:childTnLst>
+                                    <p:set>
+                                      <p:cBhvr>
+                                        <p:cTn id="20" dur="1" fill="hold">
+                                          <p:stCondLst>
+                                            <p:cond delay="0"/>
+                                          </p:stCondLst>
+                                        </p:cTn>
+                                        <p:tgtEl>
+                                          <p:spTgt spid="3">
+                                            <p:txEl>
+                                              <p:pRg st="4" end="4"/>
+                                            </p:txEl>
+                                          </p:spTgt>
+                                        </p:tgtEl>
+                                        <p:attrNameLst>
+                                          <p:attrName>style.visibility</p:attrName>
+                                        </p:attrNameLst>
+                                      </p:cBhvr>
+                                      <p:to>
+                                        <p:strVal val="visible"/>
+                                      </p:to>
+                                    </p:set>
+                                    <p:animEffect transition="in" filter="fade">
+                                      <p:cBhvr>
+                                        <p:cTn id="21" dur="500"/>
+                                        <p:tgtEl>
+                                          <p:spTgt spid="3">
+                                            <p:txEl>
+                                              <p:pRg st="4" end="4"/>
+                                            </p:txEl>
+                                          </p:spTgt>
+                                        </p:tgtEl>
+                                      </p:cBhvr>
+                                    </p:animEffect>
+                                  </p:childTnLst>
+                                </p:cTn>
+                              </p:par>
+                            </p:childTnLst>
+                          </p:cTn>
+                        </p:par>
+                      </p:childTnLst>
+                    </p:cTn>
+                  </p:par>
+                  <p:par>
+                    <p:cTn id="22" fill="hold">
+                      <p:stCondLst>
+                        <p:cond delay="indefinite"/>
+                      </p:stCondLst>
+                      <p:childTnLst>
+                        <p:par>
+                          <p:cTn id="23" fill="hold">
+                            <p:stCondLst>
+                              <p:cond delay="0"/>
+                            </p:stCondLst>
+                            <p:childTnLst>
+                              <p:par>
+                                <p:cTn id="24" presetID="10" presetClass="entr" presetSubtype="0" fill="hold" grpId="0" nodeType="clickEffect">
+                                  <p:stCondLst>
+                                    <p:cond delay="0"/>
+                                  </p:stCondLst>
+                                  <p:childTnLst>
+                                    <p:set>
+                                      <p:cBhvr>
+                                        <p:cTn id="25" dur="1" fill="hold">
+                                          <p:stCondLst>
+                                            <p:cond delay="0"/>
+                                          </p:stCondLst>
+                                        </p:cTn>
+                                        <p:tgtEl>
+                                          <p:spTgt spid="3">
+                                            <p:txEl>
+                                              <p:pRg st="5" end="5"/>
+                                            </p:txEl>
+                                          </p:spTgt>
+                                        </p:tgtEl>
+                                        <p:attrNameLst>
+                                          <p:attrName>style.visibility</p:attrName>
+                                        </p:attrNameLst>
+                                      </p:cBhvr>
+                                      <p:to>
+                                        <p:strVal val="visible"/>
+                                      </p:to>
+                                    </p:set>
+                                    <p:animEffect transition="in" filter="fade">
+                                      <p:cBhvr>
+                                        <p:cTn id="26" dur="500"/>
+                                        <p:tgtEl>
+                                          <p:spTgt spid="3">
+                                            <p:txEl>
+                                              <p:pRg st="5" end="5"/>
+                                            </p:txEl>
+                                          </p:spTgt>
+                                        </p:tgtEl>
+                                      </p:cBhvr>
+                                    </p:animEffect>
+                                  </p:childTnLst>
+                                </p:cTn>
+                              </p:par>
+                              <p:par>
+                                <p:cTn id="27" presetID="10" presetClass="entr" presetSubtype="0" fill="hold" grpId="0" nodeType="withEffect">
+                                  <p:stCondLst>
+                                    <p:cond delay="0"/>
+                                  </p:stCondLst>
+                                  <p:childTnLst>
+                                    <p:set>
+                                      <p:cBhvr>
+                                        <p:cTn id="28" dur="1" fill="hold">
+                                          <p:stCondLst>
+                                            <p:cond delay="0"/>
+                                          </p:stCondLst>
+                                        </p:cTn>
+                                        <p:tgtEl>
+                                          <p:spTgt spid="3">
+                                            <p:txEl>
+                                              <p:pRg st="6" end="6"/>
+                                            </p:txEl>
+                                          </p:spTgt>
+                                        </p:tgtEl>
+                                        <p:attrNameLst>
+                                          <p:attrName>style.visibility</p:attrName>
+                                        </p:attrNameLst>
+                                      </p:cBhvr>
+                                      <p:to>
+                                        <p:strVal val="visible"/>
+                                      </p:to>
+                                    </p:set>
+                                    <p:animEffect transition="in" filter="fade">
+                                      <p:cBhvr>
+                                        <p:cTn id="29" dur="500"/>
+                                        <p:tgtEl>
+                                          <p:spTgt spid="3">
+                                            <p:txEl>
+                                              <p:pRg st="6" end="6"/>
+                                            </p:txEl>
+                                          </p:spTgt>
+                                        </p:tgtEl>
+                                      </p:cBhvr>
+                                    </p:animEffect>
+                                  </p:childTnLst>
+                                </p:cTn>
+                              </p:par>
+                              <p:par>
+                                <p:cTn id="30" presetID="10" presetClass="entr" presetSubtype="0" fill="hold" grpId="0" nodeType="withEffect">
+                                  <p:stCondLst>
+                                    <p:cond delay="0"/>
+                                  </p:stCondLst>
+                                  <p:childTnLst>
+                                    <p:set>
+                                      <p:cBhvr>
+                                        <p:cTn id="31" dur="1" fill="hold">
+                                          <p:stCondLst>
+                                            <p:cond delay="0"/>
+                                          </p:stCondLst>
+                                        </p:cTn>
+                                        <p:tgtEl>
+                                          <p:spTgt spid="3">
+                                            <p:txEl>
+                                              <p:pRg st="7" end="7"/>
+                                            </p:txEl>
+                                          </p:spTgt>
+                                        </p:tgtEl>
+                                        <p:attrNameLst>
+                                          <p:attrName>style.visibility</p:attrName>
+                                        </p:attrNameLst>
+                                      </p:cBhvr>
+                                      <p:to>
+                                        <p:strVal val="visible"/>
+                                      </p:to>
+                                    </p:set>
+                                    <p:animEffect transition="in" filter="fade">
+                                      <p:cBhvr>
+                                        <p:cTn id="32" dur="500"/>
+                                        <p:tgtEl>
+                                          <p:spTgt spid="3">
+                                            <p:txEl>
+                                              <p:pRg st="7" end="7"/>
+                                            </p:txEl>
+                                          </p:spTgt>
+                                        </p:tgtEl>
+                                      </p:cBhvr>
+                                    </p:animEffect>
+                                  </p:childTnLst>
+                                </p:cTn>
+                              </p:par>
+                            </p:childTnLst>
+                          </p:cTn>
+                        </p:par>
+                      </p:childTnLst>
+                    </p:cTn>
+                  </p:par>
+                </p:childTnLst>
+              </p:cTn>
+              <p:prevCondLst>
+                <p:cond evt="onPrev" delay="0">
+                  <p:tgtEl>
+                    <p:sldTgt/>
+                  </p:tgtEl>
+                </p:cond>
+              </p:prevCondLst>
+              <p:nextCondLst>
+                <p:cond evt="onNext" delay="0">
+                  <p:tgtEl>
+                    <p:sldTgt/>
+                  </p:tgtEl>
+                </p:cond>
+              </p:nextCondLst>
+            </p:seq>
+          </p:childTnLst>
+        </p:cTn>
+      </p:par>
+    </p:tnLst>
+    <p:bldLst>
+      <p:bldP spid="3" grpId="0" build="p"/>
+    </p:bldLst>
+  </p:timing>
 </p:sld>
 </file>
 
@@ -36619,6 +37050,13 @@
   <p:transition>
     <p:fade/>
   </p:transition>
+  <p:timing>
+    <p:tnLst>
+      <p:par>
+        <p:cTn id="1" dur="indefinite" restart="never" nodeType="tmRoot"/>
+      </p:par>
+    </p:tnLst>
+  </p:timing>
 </p:sld>
 </file>
 
@@ -36742,6 +37180,13 @@
   <p:transition>
     <p:fade/>
   </p:transition>
+  <p:timing>
+    <p:tnLst>
+      <p:par>
+        <p:cTn id="1" dur="indefinite" restart="never" nodeType="tmRoot"/>
+      </p:par>
+    </p:tnLst>
+  </p:timing>
 </p:sld>
 </file>
 
@@ -36826,6 +37271,13 @@
   <p:transition>
     <p:fade/>
   </p:transition>
+  <p:timing>
+    <p:tnLst>
+      <p:par>
+        <p:cTn id="1" dur="indefinite" restart="never" nodeType="tmRoot"/>
+      </p:par>
+    </p:tnLst>
+  </p:timing>
 </p:sld>
 </file>
 
@@ -37044,6 +37496,222 @@
   <p:transition>
     <p:fade/>
   </p:transition>
+  <p:timing>
+    <p:tnLst>
+      <p:par>
+        <p:cTn id="1" dur="indefinite" restart="never" nodeType="tmRoot">
+          <p:childTnLst>
+            <p:seq concurrent="1" nextAc="seek">
+              <p:cTn id="2" dur="indefinite" nodeType="mainSeq">
+                <p:childTnLst>
+                  <p:par>
+                    <p:cTn id="3" fill="hold">
+                      <p:stCondLst>
+                        <p:cond delay="indefinite"/>
+                      </p:stCondLst>
+                      <p:childTnLst>
+                        <p:par>
+                          <p:cTn id="4" fill="hold">
+                            <p:stCondLst>
+                              <p:cond delay="0"/>
+                            </p:stCondLst>
+                            <p:childTnLst>
+                              <p:par>
+                                <p:cTn id="5" presetID="10" presetClass="entr" presetSubtype="0" fill="hold" grpId="0" nodeType="clickEffect">
+                                  <p:stCondLst>
+                                    <p:cond delay="0"/>
+                                  </p:stCondLst>
+                                  <p:childTnLst>
+                                    <p:set>
+                                      <p:cBhvr>
+                                        <p:cTn id="6" dur="1" fill="hold">
+                                          <p:stCondLst>
+                                            <p:cond delay="0"/>
+                                          </p:stCondLst>
+                                        </p:cTn>
+                                        <p:tgtEl>
+                                          <p:spTgt spid="3">
+                                            <p:txEl>
+                                              <p:pRg st="0" end="0"/>
+                                            </p:txEl>
+                                          </p:spTgt>
+                                        </p:tgtEl>
+                                        <p:attrNameLst>
+                                          <p:attrName>style.visibility</p:attrName>
+                                        </p:attrNameLst>
+                                      </p:cBhvr>
+                                      <p:to>
+                                        <p:strVal val="visible"/>
+                                      </p:to>
+                                    </p:set>
+                                    <p:animEffect transition="in" filter="fade">
+                                      <p:cBhvr>
+                                        <p:cTn id="7" dur="500"/>
+                                        <p:tgtEl>
+                                          <p:spTgt spid="3">
+                                            <p:txEl>
+                                              <p:pRg st="0" end="0"/>
+                                            </p:txEl>
+                                          </p:spTgt>
+                                        </p:tgtEl>
+                                      </p:cBhvr>
+                                    </p:animEffect>
+                                  </p:childTnLst>
+                                </p:cTn>
+                              </p:par>
+                            </p:childTnLst>
+                          </p:cTn>
+                        </p:par>
+                      </p:childTnLst>
+                    </p:cTn>
+                  </p:par>
+                  <p:par>
+                    <p:cTn id="8" fill="hold">
+                      <p:stCondLst>
+                        <p:cond delay="indefinite"/>
+                      </p:stCondLst>
+                      <p:childTnLst>
+                        <p:par>
+                          <p:cTn id="9" fill="hold">
+                            <p:stCondLst>
+                              <p:cond delay="0"/>
+                            </p:stCondLst>
+                            <p:childTnLst>
+                              <p:par>
+                                <p:cTn id="10" presetID="10" presetClass="entr" presetSubtype="0" fill="hold" grpId="0" nodeType="clickEffect">
+                                  <p:stCondLst>
+                                    <p:cond delay="0"/>
+                                  </p:stCondLst>
+                                  <p:childTnLst>
+                                    <p:set>
+                                      <p:cBhvr>
+                                        <p:cTn id="11" dur="1" fill="hold">
+                                          <p:stCondLst>
+                                            <p:cond delay="0"/>
+                                          </p:stCondLst>
+                                        </p:cTn>
+                                        <p:tgtEl>
+                                          <p:spTgt spid="3">
+                                            <p:txEl>
+                                              <p:pRg st="2" end="2"/>
+                                            </p:txEl>
+                                          </p:spTgt>
+                                        </p:tgtEl>
+                                        <p:attrNameLst>
+                                          <p:attrName>style.visibility</p:attrName>
+                                        </p:attrNameLst>
+                                      </p:cBhvr>
+                                      <p:to>
+                                        <p:strVal val="visible"/>
+                                      </p:to>
+                                    </p:set>
+                                    <p:animEffect transition="in" filter="fade">
+                                      <p:cBhvr>
+                                        <p:cTn id="12" dur="500"/>
+                                        <p:tgtEl>
+                                          <p:spTgt spid="3">
+                                            <p:txEl>
+                                              <p:pRg st="2" end="2"/>
+                                            </p:txEl>
+                                          </p:spTgt>
+                                        </p:tgtEl>
+                                      </p:cBhvr>
+                                    </p:animEffect>
+                                  </p:childTnLst>
+                                </p:cTn>
+                              </p:par>
+                            </p:childTnLst>
+                          </p:cTn>
+                        </p:par>
+                      </p:childTnLst>
+                    </p:cTn>
+                  </p:par>
+                  <p:par>
+                    <p:cTn id="13" fill="hold">
+                      <p:stCondLst>
+                        <p:cond delay="indefinite"/>
+                      </p:stCondLst>
+                      <p:childTnLst>
+                        <p:par>
+                          <p:cTn id="14" fill="hold">
+                            <p:stCondLst>
+                              <p:cond delay="0"/>
+                            </p:stCondLst>
+                            <p:childTnLst>
+                              <p:par>
+                                <p:cTn id="15" presetID="10" presetClass="entr" presetSubtype="0" fill="hold" grpId="0" nodeType="clickEffect">
+                                  <p:stCondLst>
+                                    <p:cond delay="0"/>
+                                  </p:stCondLst>
+                                  <p:childTnLst>
+                                    <p:set>
+                                      <p:cBhvr>
+                                        <p:cTn id="16" dur="1" fill="hold">
+                                          <p:stCondLst>
+                                            <p:cond delay="0"/>
+                                          </p:stCondLst>
+                                        </p:cTn>
+                                        <p:tgtEl>
+                                          <p:spTgt spid="3">
+                                            <p:txEl>
+                                              <p:pRg st="4" end="4"/>
+                                            </p:txEl>
+                                          </p:spTgt>
+                                        </p:tgtEl>
+                                        <p:attrNameLst>
+                                          <p:attrName>style.visibility</p:attrName>
+                                        </p:attrNameLst>
+                                      </p:cBhvr>
+                                      <p:to>
+                                        <p:strVal val="visible"/>
+                                      </p:to>
+                                    </p:set>
+                                    <p:animEffect transition="in" filter="fade">
+                                      <p:cBhvr>
+                                        <p:cTn id="17" dur="500"/>
+                                        <p:tgtEl>
+                                          <p:spTgt spid="3">
+                                            <p:txEl>
+                                              <p:pRg st="4" end="4"/>
+                                            </p:txEl>
+                                          </p:spTgt>
+                                        </p:tgtEl>
+                                      </p:cBhvr>
+                                    </p:animEffect>
+                                  </p:childTnLst>
+                                </p:cTn>
+                              </p:par>
+                            </p:childTnLst>
+                          </p:cTn>
+                        </p:par>
+                      </p:childTnLst>
+                    </p:cTn>
+                  </p:par>
+                </p:childTnLst>
+              </p:cTn>
+              <p:prevCondLst>
+                <p:cond evt="onPrev" delay="0">
+                  <p:tgtEl>
+                    <p:sldTgt/>
+                  </p:tgtEl>
+                </p:cond>
+              </p:prevCondLst>
+              <p:nextCondLst>
+                <p:cond evt="onNext" delay="0">
+                  <p:tgtEl>
+                    <p:sldTgt/>
+                  </p:tgtEl>
+                </p:cond>
+              </p:nextCondLst>
+            </p:seq>
+          </p:childTnLst>
+        </p:cTn>
+      </p:par>
+    </p:tnLst>
+    <p:bldLst>
+      <p:bldP spid="3" grpId="0" build="p"/>
+    </p:bldLst>
+  </p:timing>
 </p:sld>
 </file>
 
@@ -37193,9 +37861,218 @@
   <p:timing>
     <p:tnLst>
       <p:par>
-        <p:cTn id="1" dur="indefinite" restart="never" nodeType="tmRoot"/>
+        <p:cTn id="1" dur="indefinite" restart="never" nodeType="tmRoot">
+          <p:childTnLst>
+            <p:seq concurrent="1" nextAc="seek">
+              <p:cTn id="2" dur="indefinite" nodeType="mainSeq">
+                <p:childTnLst>
+                  <p:par>
+                    <p:cTn id="3" fill="hold">
+                      <p:stCondLst>
+                        <p:cond delay="indefinite"/>
+                      </p:stCondLst>
+                      <p:childTnLst>
+                        <p:par>
+                          <p:cTn id="4" fill="hold">
+                            <p:stCondLst>
+                              <p:cond delay="0"/>
+                            </p:stCondLst>
+                            <p:childTnLst>
+                              <p:par>
+                                <p:cTn id="5" presetID="10" presetClass="entr" presetSubtype="0" fill="hold" grpId="0" nodeType="clickEffect">
+                                  <p:stCondLst>
+                                    <p:cond delay="0"/>
+                                  </p:stCondLst>
+                                  <p:childTnLst>
+                                    <p:set>
+                                      <p:cBhvr>
+                                        <p:cTn id="6" dur="1" fill="hold">
+                                          <p:stCondLst>
+                                            <p:cond delay="0"/>
+                                          </p:stCondLst>
+                                        </p:cTn>
+                                        <p:tgtEl>
+                                          <p:spTgt spid="3">
+                                            <p:txEl>
+                                              <p:pRg st="1" end="1"/>
+                                            </p:txEl>
+                                          </p:spTgt>
+                                        </p:tgtEl>
+                                        <p:attrNameLst>
+                                          <p:attrName>style.visibility</p:attrName>
+                                        </p:attrNameLst>
+                                      </p:cBhvr>
+                                      <p:to>
+                                        <p:strVal val="visible"/>
+                                      </p:to>
+                                    </p:set>
+                                    <p:animEffect transition="in" filter="fade">
+                                      <p:cBhvr>
+                                        <p:cTn id="7" dur="500"/>
+                                        <p:tgtEl>
+                                          <p:spTgt spid="3">
+                                            <p:txEl>
+                                              <p:pRg st="1" end="1"/>
+                                            </p:txEl>
+                                          </p:spTgt>
+                                        </p:tgtEl>
+                                      </p:cBhvr>
+                                    </p:animEffect>
+                                  </p:childTnLst>
+                                </p:cTn>
+                              </p:par>
+                            </p:childTnLst>
+                          </p:cTn>
+                        </p:par>
+                      </p:childTnLst>
+                    </p:cTn>
+                  </p:par>
+                  <p:par>
+                    <p:cTn id="8" fill="hold">
+                      <p:stCondLst>
+                        <p:cond delay="indefinite"/>
+                      </p:stCondLst>
+                      <p:childTnLst>
+                        <p:par>
+                          <p:cTn id="9" fill="hold">
+                            <p:stCondLst>
+                              <p:cond delay="0"/>
+                            </p:stCondLst>
+                            <p:childTnLst>
+                              <p:par>
+                                <p:cTn id="10" presetID="10" presetClass="entr" presetSubtype="0" fill="hold" grpId="0" nodeType="clickEffect">
+                                  <p:stCondLst>
+                                    <p:cond delay="0"/>
+                                  </p:stCondLst>
+                                  <p:childTnLst>
+                                    <p:set>
+                                      <p:cBhvr>
+                                        <p:cTn id="11" dur="1" fill="hold">
+                                          <p:stCondLst>
+                                            <p:cond delay="0"/>
+                                          </p:stCondLst>
+                                        </p:cTn>
+                                        <p:tgtEl>
+                                          <p:spTgt spid="3">
+                                            <p:txEl>
+                                              <p:pRg st="3" end="3"/>
+                                            </p:txEl>
+                                          </p:spTgt>
+                                        </p:tgtEl>
+                                        <p:attrNameLst>
+                                          <p:attrName>style.visibility</p:attrName>
+                                        </p:attrNameLst>
+                                      </p:cBhvr>
+                                      <p:to>
+                                        <p:strVal val="visible"/>
+                                      </p:to>
+                                    </p:set>
+                                    <p:animEffect transition="in" filter="fade">
+                                      <p:cBhvr>
+                                        <p:cTn id="12" dur="500"/>
+                                        <p:tgtEl>
+                                          <p:spTgt spid="3">
+                                            <p:txEl>
+                                              <p:pRg st="3" end="3"/>
+                                            </p:txEl>
+                                          </p:spTgt>
+                                        </p:tgtEl>
+                                      </p:cBhvr>
+                                    </p:animEffect>
+                                  </p:childTnLst>
+                                </p:cTn>
+                              </p:par>
+                            </p:childTnLst>
+                          </p:cTn>
+                        </p:par>
+                      </p:childTnLst>
+                    </p:cTn>
+                  </p:par>
+                  <p:par>
+                    <p:cTn id="13" fill="hold">
+                      <p:stCondLst>
+                        <p:cond delay="indefinite"/>
+                      </p:stCondLst>
+                      <p:childTnLst>
+                        <p:par>
+                          <p:cTn id="14" fill="hold">
+                            <p:stCondLst>
+                              <p:cond delay="0"/>
+                            </p:stCondLst>
+                            <p:childTnLst>
+                              <p:par>
+                                <p:cTn id="15" presetID="10" presetClass="entr" presetSubtype="0" fill="hold" grpId="0" nodeType="clickEffect">
+                                  <p:stCondLst>
+                                    <p:cond delay="0"/>
+                                  </p:stCondLst>
+                                  <p:childTnLst>
+                                    <p:set>
+                                      <p:cBhvr>
+                                        <p:cTn id="16" dur="1" fill="hold">
+                                          <p:stCondLst>
+                                            <p:cond delay="0"/>
+                                          </p:stCondLst>
+                                        </p:cTn>
+                                        <p:tgtEl>
+                                          <p:spTgt spid="3">
+                                            <p:txEl>
+                                              <p:pRg st="5" end="5"/>
+                                            </p:txEl>
+                                          </p:spTgt>
+                                        </p:tgtEl>
+                                        <p:attrNameLst>
+                                          <p:attrName>style.visibility</p:attrName>
+                                        </p:attrNameLst>
+                                      </p:cBhvr>
+                                      <p:to>
+                                        <p:strVal val="visible"/>
+                                      </p:to>
+                                    </p:set>
+                                    <p:animEffect transition="in" filter="fade">
+                                      <p:cBhvr>
+                                        <p:cTn id="17" dur="500"/>
+                                        <p:tgtEl>
+                                          <p:spTgt spid="3">
+                                            <p:txEl>
+                                              <p:pRg st="5" end="5"/>
+                                            </p:txEl>
+                                          </p:spTgt>
+                                        </p:tgtEl>
+                                      </p:cBhvr>
+                                    </p:animEffect>
+                                  </p:childTnLst>
+                                </p:cTn>
+                              </p:par>
+                            </p:childTnLst>
+                          </p:cTn>
+                        </p:par>
+                      </p:childTnLst>
+                    </p:cTn>
+                  </p:par>
+                </p:childTnLst>
+              </p:cTn>
+              <p:prevCondLst>
+                <p:cond evt="onPrev" delay="0">
+                  <p:tgtEl>
+                    <p:sldTgt/>
+                  </p:tgtEl>
+                </p:cond>
+              </p:prevCondLst>
+              <p:nextCondLst>
+                <p:cond evt="onNext" delay="0">
+                  <p:tgtEl>
+                    <p:sldTgt/>
+                  </p:tgtEl>
+                </p:cond>
+              </p:nextCondLst>
+            </p:seq>
+          </p:childTnLst>
+        </p:cTn>
       </p:par>
     </p:tnLst>
+    <p:bldLst>
+      <p:bldP spid="3" grpId="0" build="p"/>
+    </p:bldLst>
   </p:timing>
 </p:sld>
 </file>
@@ -38458,7 +39335,15 @@
             </a:r>
             <a:r>
               <a:rPr lang="en-US" dirty="0"/>
-              <a:t> is a Windows folder, just like in File Explorer</a:t>
+              <a:t> is </a:t>
+            </a:r>
+            <a:r>
+              <a:rPr lang="en-US" dirty="0" smtClean="0"/>
+              <a:t>a folder</a:t>
+            </a:r>
+            <a:r>
+              <a:rPr lang="en-US" dirty="0"/>
+              <a:t>, just like in File Explorer</a:t>
             </a:r>
           </a:p>
           <a:p>
@@ -38557,6 +39442,394 @@
   <p:transition>
     <p:fade/>
   </p:transition>
+  <p:timing>
+    <p:tnLst>
+      <p:par>
+        <p:cTn id="1" dur="indefinite" restart="never" nodeType="tmRoot">
+          <p:childTnLst>
+            <p:seq concurrent="1" nextAc="seek">
+              <p:cTn id="2" dur="indefinite" nodeType="mainSeq">
+                <p:childTnLst>
+                  <p:par>
+                    <p:cTn id="3" fill="hold">
+                      <p:stCondLst>
+                        <p:cond delay="indefinite"/>
+                      </p:stCondLst>
+                      <p:childTnLst>
+                        <p:par>
+                          <p:cTn id="4" fill="hold">
+                            <p:stCondLst>
+                              <p:cond delay="0"/>
+                            </p:stCondLst>
+                            <p:childTnLst>
+                              <p:par>
+                                <p:cTn id="5" presetID="10" presetClass="entr" presetSubtype="0" fill="hold" grpId="0" nodeType="clickEffect">
+                                  <p:stCondLst>
+                                    <p:cond delay="0"/>
+                                  </p:stCondLst>
+                                  <p:childTnLst>
+                                    <p:set>
+                                      <p:cBhvr>
+                                        <p:cTn id="6" dur="1" fill="hold">
+                                          <p:stCondLst>
+                                            <p:cond delay="0"/>
+                                          </p:stCondLst>
+                                        </p:cTn>
+                                        <p:tgtEl>
+                                          <p:spTgt spid="3">
+                                            <p:txEl>
+                                              <p:pRg st="0" end="0"/>
+                                            </p:txEl>
+                                          </p:spTgt>
+                                        </p:tgtEl>
+                                        <p:attrNameLst>
+                                          <p:attrName>style.visibility</p:attrName>
+                                        </p:attrNameLst>
+                                      </p:cBhvr>
+                                      <p:to>
+                                        <p:strVal val="visible"/>
+                                      </p:to>
+                                    </p:set>
+                                    <p:animEffect transition="in" filter="fade">
+                                      <p:cBhvr>
+                                        <p:cTn id="7" dur="500"/>
+                                        <p:tgtEl>
+                                          <p:spTgt spid="3">
+                                            <p:txEl>
+                                              <p:pRg st="0" end="0"/>
+                                            </p:txEl>
+                                          </p:spTgt>
+                                        </p:tgtEl>
+                                      </p:cBhvr>
+                                    </p:animEffect>
+                                  </p:childTnLst>
+                                </p:cTn>
+                              </p:par>
+                              <p:par>
+                                <p:cTn id="8" presetID="10" presetClass="entr" presetSubtype="0" fill="hold" grpId="0" nodeType="withEffect">
+                                  <p:stCondLst>
+                                    <p:cond delay="0"/>
+                                  </p:stCondLst>
+                                  <p:childTnLst>
+                                    <p:set>
+                                      <p:cBhvr>
+                                        <p:cTn id="9" dur="1" fill="hold">
+                                          <p:stCondLst>
+                                            <p:cond delay="0"/>
+                                          </p:stCondLst>
+                                        </p:cTn>
+                                        <p:tgtEl>
+                                          <p:spTgt spid="3">
+                                            <p:txEl>
+                                              <p:pRg st="1" end="1"/>
+                                            </p:txEl>
+                                          </p:spTgt>
+                                        </p:tgtEl>
+                                        <p:attrNameLst>
+                                          <p:attrName>style.visibility</p:attrName>
+                                        </p:attrNameLst>
+                                      </p:cBhvr>
+                                      <p:to>
+                                        <p:strVal val="visible"/>
+                                      </p:to>
+                                    </p:set>
+                                    <p:animEffect transition="in" filter="fade">
+                                      <p:cBhvr>
+                                        <p:cTn id="10" dur="500"/>
+                                        <p:tgtEl>
+                                          <p:spTgt spid="3">
+                                            <p:txEl>
+                                              <p:pRg st="1" end="1"/>
+                                            </p:txEl>
+                                          </p:spTgt>
+                                        </p:tgtEl>
+                                      </p:cBhvr>
+                                    </p:animEffect>
+                                  </p:childTnLst>
+                                </p:cTn>
+                              </p:par>
+                            </p:childTnLst>
+                          </p:cTn>
+                        </p:par>
+                      </p:childTnLst>
+                    </p:cTn>
+                  </p:par>
+                  <p:par>
+                    <p:cTn id="11" fill="hold">
+                      <p:stCondLst>
+                        <p:cond delay="indefinite"/>
+                      </p:stCondLst>
+                      <p:childTnLst>
+                        <p:par>
+                          <p:cTn id="12" fill="hold">
+                            <p:stCondLst>
+                              <p:cond delay="0"/>
+                            </p:stCondLst>
+                            <p:childTnLst>
+                              <p:par>
+                                <p:cTn id="13" presetID="10" presetClass="entr" presetSubtype="0" fill="hold" grpId="0" nodeType="clickEffect">
+                                  <p:stCondLst>
+                                    <p:cond delay="0"/>
+                                  </p:stCondLst>
+                                  <p:childTnLst>
+                                    <p:set>
+                                      <p:cBhvr>
+                                        <p:cTn id="14" dur="1" fill="hold">
+                                          <p:stCondLst>
+                                            <p:cond delay="0"/>
+                                          </p:stCondLst>
+                                        </p:cTn>
+                                        <p:tgtEl>
+                                          <p:spTgt spid="3">
+                                            <p:txEl>
+                                              <p:pRg st="3" end="3"/>
+                                            </p:txEl>
+                                          </p:spTgt>
+                                        </p:tgtEl>
+                                        <p:attrNameLst>
+                                          <p:attrName>style.visibility</p:attrName>
+                                        </p:attrNameLst>
+                                      </p:cBhvr>
+                                      <p:to>
+                                        <p:strVal val="visible"/>
+                                      </p:to>
+                                    </p:set>
+                                    <p:animEffect transition="in" filter="fade">
+                                      <p:cBhvr>
+                                        <p:cTn id="15" dur="500"/>
+                                        <p:tgtEl>
+                                          <p:spTgt spid="3">
+                                            <p:txEl>
+                                              <p:pRg st="3" end="3"/>
+                                            </p:txEl>
+                                          </p:spTgt>
+                                        </p:tgtEl>
+                                      </p:cBhvr>
+                                    </p:animEffect>
+                                  </p:childTnLst>
+                                </p:cTn>
+                              </p:par>
+                              <p:par>
+                                <p:cTn id="16" presetID="10" presetClass="entr" presetSubtype="0" fill="hold" grpId="0" nodeType="withEffect">
+                                  <p:stCondLst>
+                                    <p:cond delay="0"/>
+                                  </p:stCondLst>
+                                  <p:childTnLst>
+                                    <p:set>
+                                      <p:cBhvr>
+                                        <p:cTn id="17" dur="1" fill="hold">
+                                          <p:stCondLst>
+                                            <p:cond delay="0"/>
+                                          </p:stCondLst>
+                                        </p:cTn>
+                                        <p:tgtEl>
+                                          <p:spTgt spid="3">
+                                            <p:txEl>
+                                              <p:pRg st="4" end="4"/>
+                                            </p:txEl>
+                                          </p:spTgt>
+                                        </p:tgtEl>
+                                        <p:attrNameLst>
+                                          <p:attrName>style.visibility</p:attrName>
+                                        </p:attrNameLst>
+                                      </p:cBhvr>
+                                      <p:to>
+                                        <p:strVal val="visible"/>
+                                      </p:to>
+                                    </p:set>
+                                    <p:animEffect transition="in" filter="fade">
+                                      <p:cBhvr>
+                                        <p:cTn id="18" dur="500"/>
+                                        <p:tgtEl>
+                                          <p:spTgt spid="3">
+                                            <p:txEl>
+                                              <p:pRg st="4" end="4"/>
+                                            </p:txEl>
+                                          </p:spTgt>
+                                        </p:tgtEl>
+                                      </p:cBhvr>
+                                    </p:animEffect>
+                                  </p:childTnLst>
+                                </p:cTn>
+                              </p:par>
+                            </p:childTnLst>
+                          </p:cTn>
+                        </p:par>
+                      </p:childTnLst>
+                    </p:cTn>
+                  </p:par>
+                  <p:par>
+                    <p:cTn id="19" fill="hold">
+                      <p:stCondLst>
+                        <p:cond delay="indefinite"/>
+                      </p:stCondLst>
+                      <p:childTnLst>
+                        <p:par>
+                          <p:cTn id="20" fill="hold">
+                            <p:stCondLst>
+                              <p:cond delay="0"/>
+                            </p:stCondLst>
+                            <p:childTnLst>
+                              <p:par>
+                                <p:cTn id="21" presetID="10" presetClass="entr" presetSubtype="0" fill="hold" grpId="0" nodeType="clickEffect">
+                                  <p:stCondLst>
+                                    <p:cond delay="0"/>
+                                  </p:stCondLst>
+                                  <p:childTnLst>
+                                    <p:set>
+                                      <p:cBhvr>
+                                        <p:cTn id="22" dur="1" fill="hold">
+                                          <p:stCondLst>
+                                            <p:cond delay="0"/>
+                                          </p:stCondLst>
+                                        </p:cTn>
+                                        <p:tgtEl>
+                                          <p:spTgt spid="3">
+                                            <p:txEl>
+                                              <p:pRg st="6" end="6"/>
+                                            </p:txEl>
+                                          </p:spTgt>
+                                        </p:tgtEl>
+                                        <p:attrNameLst>
+                                          <p:attrName>style.visibility</p:attrName>
+                                        </p:attrNameLst>
+                                      </p:cBhvr>
+                                      <p:to>
+                                        <p:strVal val="visible"/>
+                                      </p:to>
+                                    </p:set>
+                                    <p:animEffect transition="in" filter="fade">
+                                      <p:cBhvr>
+                                        <p:cTn id="23" dur="500"/>
+                                        <p:tgtEl>
+                                          <p:spTgt spid="3">
+                                            <p:txEl>
+                                              <p:pRg st="6" end="6"/>
+                                            </p:txEl>
+                                          </p:spTgt>
+                                        </p:tgtEl>
+                                      </p:cBhvr>
+                                    </p:animEffect>
+                                  </p:childTnLst>
+                                </p:cTn>
+                              </p:par>
+                              <p:par>
+                                <p:cTn id="24" presetID="10" presetClass="entr" presetSubtype="0" fill="hold" grpId="0" nodeType="withEffect">
+                                  <p:stCondLst>
+                                    <p:cond delay="0"/>
+                                  </p:stCondLst>
+                                  <p:childTnLst>
+                                    <p:set>
+                                      <p:cBhvr>
+                                        <p:cTn id="25" dur="1" fill="hold">
+                                          <p:stCondLst>
+                                            <p:cond delay="0"/>
+                                          </p:stCondLst>
+                                        </p:cTn>
+                                        <p:tgtEl>
+                                          <p:spTgt spid="3">
+                                            <p:txEl>
+                                              <p:pRg st="7" end="7"/>
+                                            </p:txEl>
+                                          </p:spTgt>
+                                        </p:tgtEl>
+                                        <p:attrNameLst>
+                                          <p:attrName>style.visibility</p:attrName>
+                                        </p:attrNameLst>
+                                      </p:cBhvr>
+                                      <p:to>
+                                        <p:strVal val="visible"/>
+                                      </p:to>
+                                    </p:set>
+                                    <p:animEffect transition="in" filter="fade">
+                                      <p:cBhvr>
+                                        <p:cTn id="26" dur="500"/>
+                                        <p:tgtEl>
+                                          <p:spTgt spid="3">
+                                            <p:txEl>
+                                              <p:pRg st="7" end="7"/>
+                                            </p:txEl>
+                                          </p:spTgt>
+                                        </p:tgtEl>
+                                      </p:cBhvr>
+                                    </p:animEffect>
+                                  </p:childTnLst>
+                                </p:cTn>
+                              </p:par>
+                              <p:par>
+                                <p:cTn id="27" presetID="10" presetClass="entr" presetSubtype="0" fill="hold" grpId="0" nodeType="withEffect">
+                                  <p:stCondLst>
+                                    <p:cond delay="0"/>
+                                  </p:stCondLst>
+                                  <p:childTnLst>
+                                    <p:set>
+                                      <p:cBhvr>
+                                        <p:cTn id="28" dur="1" fill="hold">
+                                          <p:stCondLst>
+                                            <p:cond delay="0"/>
+                                          </p:stCondLst>
+                                        </p:cTn>
+                                        <p:tgtEl>
+                                          <p:spTgt spid="3">
+                                            <p:txEl>
+                                              <p:pRg st="8" end="8"/>
+                                            </p:txEl>
+                                          </p:spTgt>
+                                        </p:tgtEl>
+                                        <p:attrNameLst>
+                                          <p:attrName>style.visibility</p:attrName>
+                                        </p:attrNameLst>
+                                      </p:cBhvr>
+                                      <p:to>
+                                        <p:strVal val="visible"/>
+                                      </p:to>
+                                    </p:set>
+                                    <p:animEffect transition="in" filter="fade">
+                                      <p:cBhvr>
+                                        <p:cTn id="29" dur="500"/>
+                                        <p:tgtEl>
+                                          <p:spTgt spid="3">
+                                            <p:txEl>
+                                              <p:pRg st="8" end="8"/>
+                                            </p:txEl>
+                                          </p:spTgt>
+                                        </p:tgtEl>
+                                      </p:cBhvr>
+                                    </p:animEffect>
+                                  </p:childTnLst>
+                                </p:cTn>
+                              </p:par>
+                            </p:childTnLst>
+                          </p:cTn>
+                        </p:par>
+                      </p:childTnLst>
+                    </p:cTn>
+                  </p:par>
+                </p:childTnLst>
+              </p:cTn>
+              <p:prevCondLst>
+                <p:cond evt="onPrev" delay="0">
+                  <p:tgtEl>
+                    <p:sldTgt/>
+                  </p:tgtEl>
+                </p:cond>
+              </p:prevCondLst>
+              <p:nextCondLst>
+                <p:cond evt="onNext" delay="0">
+                  <p:tgtEl>
+                    <p:sldTgt/>
+                  </p:tgtEl>
+                </p:cond>
+              </p:nextCondLst>
+            </p:seq>
+          </p:childTnLst>
+        </p:cTn>
+      </p:par>
+    </p:tnLst>
+    <p:bldLst>
+      <p:bldP spid="3" grpId="0" build="p"/>
+    </p:bldLst>
+  </p:timing>
 </p:sld>
 </file>
 
@@ -38881,6 +40154,13 @@
   <p:transition>
     <p:fade/>
   </p:transition>
+  <p:timing>
+    <p:tnLst>
+      <p:par>
+        <p:cTn id="1" dur="indefinite" restart="never" nodeType="tmRoot"/>
+      </p:par>
+    </p:tnLst>
+  </p:timing>
 </p:sld>
 </file>
 

</xml_diff>

<commit_message>
Add questions slides to end of ppts
</commit_message>
<xml_diff>
--- a/CommandLine/CommandLine.pptx
+++ b/CommandLine/CommandLine.pptx
@@ -5,7 +5,7 @@
     <p:sldMasterId id="2147483648" r:id="rId1"/>
   </p:sldMasterIdLst>
   <p:notesMasterIdLst>
-    <p:notesMasterId r:id="rId14"/>
+    <p:notesMasterId r:id="rId15"/>
   </p:notesMasterIdLst>
   <p:sldIdLst>
     <p:sldId id="258" r:id="rId2"/>
@@ -20,6 +20,7 @@
     <p:sldId id="267" r:id="rId11"/>
     <p:sldId id="268" r:id="rId12"/>
     <p:sldId id="269" r:id="rId13"/>
+    <p:sldId id="270" r:id="rId14"/>
   </p:sldIdLst>
   <p:sldSz cx="12192000" cy="6858000"/>
   <p:notesSz cx="6858000" cy="9144000"/>
@@ -219,7 +220,7 @@
           <a:p>
             <a:fld id="{19104133-B5B0-4351-8158-4F0E5EB1E2BF}" type="datetimeFigureOut">
               <a:rPr lang="en-US" smtClean="0"/>
-              <a:t>5/11/2020</a:t>
+              <a:t>1/20/2021</a:t>
             </a:fld>
             <a:endParaRPr lang="en-US"/>
           </a:p>
@@ -283,38 +284,37 @@
           <a:p>
             <a:pPr lvl="0"/>
             <a:r>
-              <a:rPr lang="en-US" smtClean="0"/>
+              <a:rPr lang="en-US"/>
               <a:t>Edit Master text styles</a:t>
             </a:r>
           </a:p>
           <a:p>
             <a:pPr lvl="1"/>
             <a:r>
-              <a:rPr lang="en-US" smtClean="0"/>
+              <a:rPr lang="en-US"/>
               <a:t>Second level</a:t>
             </a:r>
           </a:p>
           <a:p>
             <a:pPr lvl="2"/>
             <a:r>
-              <a:rPr lang="en-US" smtClean="0"/>
+              <a:rPr lang="en-US"/>
               <a:t>Third level</a:t>
             </a:r>
           </a:p>
           <a:p>
             <a:pPr lvl="3"/>
             <a:r>
-              <a:rPr lang="en-US" smtClean="0"/>
+              <a:rPr lang="en-US"/>
               <a:t>Fourth level</a:t>
             </a:r>
           </a:p>
           <a:p>
             <a:pPr lvl="4"/>
             <a:r>
-              <a:rPr lang="en-US" smtClean="0"/>
+              <a:rPr lang="en-US"/>
               <a:t>Fifth level</a:t>
             </a:r>
-            <a:endParaRPr lang="en-US"/>
           </a:p>
         </p:txBody>
       </p:sp>
@@ -633,18 +633,18 @@
               <a:defRPr/>
             </a:pPr>
             <a:r>
-              <a:rPr lang="en-US" dirty="0" smtClean="0"/>
+              <a:rPr lang="en-US" dirty="0"/>
               <a:t>It will be helpful to show these commands in action in a </a:t>
             </a:r>
             <a:r>
-              <a:rPr lang="en-US" dirty="0" err="1" smtClean="0"/>
+              <a:rPr lang="en-US" dirty="0" err="1"/>
               <a:t>Git</a:t>
             </a:r>
             <a:r>
-              <a:rPr lang="en-US" baseline="0" dirty="0" smtClean="0"/>
+              <a:rPr lang="en-US" baseline="0" dirty="0"/>
               <a:t> Bash instance</a:t>
             </a:r>
-            <a:endParaRPr lang="en-US" dirty="0" smtClean="0"/>
+            <a:endParaRPr lang="en-US" dirty="0"/>
           </a:p>
         </p:txBody>
       </p:sp>
@@ -746,22 +746,22 @@
               <a:defRPr/>
             </a:pPr>
             <a:r>
-              <a:rPr lang="en-US" dirty="0" smtClean="0"/>
+              <a:rPr lang="en-US" dirty="0"/>
               <a:t>For</a:t>
             </a:r>
             <a:r>
-              <a:rPr lang="en-US" baseline="0" dirty="0" smtClean="0"/>
+              <a:rPr lang="en-US" baseline="0" dirty="0"/>
               <a:t> these examples, if the user was in the /c/Users/</a:t>
             </a:r>
             <a:r>
-              <a:rPr lang="en-US" baseline="0" dirty="0" err="1" smtClean="0"/>
+              <a:rPr lang="en-US" baseline="0" dirty="0" err="1"/>
               <a:t>bburger</a:t>
             </a:r>
             <a:r>
-              <a:rPr lang="en-US" baseline="0" dirty="0" smtClean="0"/>
+              <a:rPr lang="en-US" baseline="0" dirty="0"/>
               <a:t> directory, the absolute and relative paths would go to the same place</a:t>
             </a:r>
-            <a:endParaRPr lang="en-US" dirty="0" smtClean="0"/>
+            <a:endParaRPr lang="en-US" dirty="0"/>
           </a:p>
         </p:txBody>
       </p:sp>
@@ -849,11 +849,11 @@
               <a:buAutoNum type="arabicPeriod"/>
             </a:pPr>
             <a:r>
-              <a:rPr lang="en-US" dirty="0" smtClean="0"/>
+              <a:rPr lang="en-US" dirty="0"/>
               <a:t>The current</a:t>
             </a:r>
             <a:r>
-              <a:rPr lang="en-US" baseline="0" dirty="0" smtClean="0"/>
+              <a:rPr lang="en-US" baseline="0" dirty="0"/>
               <a:t> directory would change</a:t>
             </a:r>
           </a:p>
@@ -862,7 +862,7 @@
               <a:buAutoNum type="arabicPeriod"/>
             </a:pPr>
             <a:r>
-              <a:rPr lang="en-US" baseline="0" dirty="0" smtClean="0"/>
+              <a:rPr lang="en-US" baseline="0" dirty="0"/>
               <a:t>It would change to two levels up</a:t>
             </a:r>
           </a:p>
@@ -870,17 +870,17 @@
             <a:pPr marL="228600" indent="-228600">
               <a:buAutoNum type="arabicPeriod"/>
             </a:pPr>
-            <a:endParaRPr lang="en-US" baseline="0" dirty="0" smtClean="0"/>
+            <a:endParaRPr lang="en-US" baseline="0" dirty="0"/>
           </a:p>
           <a:p>
             <a:pPr marL="0" indent="0">
               <a:buNone/>
             </a:pPr>
             <a:r>
-              <a:rPr lang="en-US" baseline="0" dirty="0" smtClean="0"/>
+              <a:rPr lang="en-US" baseline="0" dirty="0"/>
               <a:t>Have the students write down what they think would happen, then call on one to share</a:t>
             </a:r>
-            <a:endParaRPr lang="en-US" dirty="0" smtClean="0"/>
+            <a:endParaRPr lang="en-US" dirty="0"/>
           </a:p>
           <a:p>
             <a:endParaRPr lang="en-US" dirty="0"/>
@@ -1063,15 +1063,7 @@
           <a:p>
             <a:r>
               <a:rPr lang="en-US" dirty="0"/>
-              <a:t>Click to edit Master </a:t>
-            </a:r>
-            <a:r>
-              <a:rPr lang="en-US" dirty="0" smtClean="0"/>
-              <a:t>subtitle </a:t>
-            </a:r>
-            <a:r>
-              <a:rPr lang="en-US" dirty="0"/>
-              <a:t>style</a:t>
+              <a:t>Click to edit Master subtitle style</a:t>
             </a:r>
           </a:p>
         </p:txBody>
@@ -1113,7 +1105,7 @@
             <a:fld id="{1C2D31DE-C454-491C-B5C3-F097855E3DF7}" type="datetime4">
               <a:rPr lang="en-US" smtClean="0"/>
               <a:pPr/>
-              <a:t>May 11, 2020</a:t>
+              <a:t>January 20, 2021</a:t>
             </a:fld>
             <a:endParaRPr lang="en-US" dirty="0"/>
           </a:p>
@@ -4187,17 +4179,16 @@
           <a:p>
             <a:pPr lvl="0"/>
             <a:r>
-              <a:rPr lang="en-US" dirty="0" smtClean="0"/>
+              <a:rPr lang="en-US" dirty="0"/>
               <a:t>Presenter Name</a:t>
             </a:r>
             <a:br>
-              <a:rPr lang="en-US" dirty="0" smtClean="0"/>
+              <a:rPr lang="en-US" dirty="0"/>
             </a:br>
             <a:r>
-              <a:rPr lang="en-US" dirty="0" smtClean="0"/>
+              <a:rPr lang="en-US" dirty="0"/>
               <a:t>Presenter Title</a:t>
             </a:r>
-            <a:endParaRPr lang="en-US" dirty="0"/>
           </a:p>
         </p:txBody>
       </p:sp>
@@ -4214,13 +4205,6 @@
   <p:transition>
     <p:fade/>
   </p:transition>
-  <p:timing>
-    <p:tnLst>
-      <p:par>
-        <p:cTn id="1" dur="indefinite" restart="never" nodeType="tmRoot"/>
-      </p:par>
-    </p:tnLst>
-  </p:timing>
   <p:hf sldNum="0" hdr="0" ftr="0"/>
 </p:sldLayout>
 </file>
@@ -4513,7 +4497,7 @@
           <a:p>
             <a:fld id="{5958763E-B898-436D-883D-03711491D54A}" type="datetimeFigureOut">
               <a:rPr lang="en-US" smtClean="0"/>
-              <a:t>5/11/2020</a:t>
+              <a:t>1/20/2021</a:t>
             </a:fld>
             <a:endParaRPr lang="en-US"/>
           </a:p>
@@ -4586,13 +4570,6 @@
   <p:transition>
     <p:fade/>
   </p:transition>
-  <p:timing>
-    <p:tnLst>
-      <p:par>
-        <p:cTn id="1" dur="indefinite" restart="never" nodeType="tmRoot"/>
-      </p:par>
-    </p:tnLst>
-  </p:timing>
 </p:sldLayout>
 </file>
 
@@ -4641,10 +4618,9 @@
           </a:lstStyle>
           <a:p>
             <a:r>
-              <a:rPr lang="en-US" dirty="0" smtClean="0"/>
+              <a:rPr lang="en-US" dirty="0"/>
               <a:t>Click icon to add picture</a:t>
             </a:r>
-            <a:endParaRPr lang="en-US" dirty="0"/>
           </a:p>
         </p:txBody>
       </p:sp>
@@ -4714,7 +4690,7 @@
           <a:p>
             <a:fld id="{5958763E-B898-436D-883D-03711491D54A}" type="datetimeFigureOut">
               <a:rPr lang="en-US" smtClean="0"/>
-              <a:t>5/11/2020</a:t>
+              <a:t>1/20/2021</a:t>
             </a:fld>
             <a:endParaRPr lang="en-US"/>
           </a:p>
@@ -4787,13 +4763,6 @@
   <p:transition>
     <p:fade/>
   </p:transition>
-  <p:timing>
-    <p:tnLst>
-      <p:par>
-        <p:cTn id="1" dur="indefinite" restart="never" nodeType="tmRoot"/>
-      </p:par>
-    </p:tnLst>
-  </p:timing>
 </p:sldLayout>
 </file>
 
@@ -4971,7 +4940,7 @@
           <a:p>
             <a:fld id="{5958763E-B898-436D-883D-03711491D54A}" type="datetimeFigureOut">
               <a:rPr lang="en-US" smtClean="0"/>
-              <a:t>5/11/2020</a:t>
+              <a:t>1/20/2021</a:t>
             </a:fld>
             <a:endParaRPr lang="en-US"/>
           </a:p>
@@ -5044,13 +5013,6 @@
   <p:transition>
     <p:fade/>
   </p:transition>
-  <p:timing>
-    <p:tnLst>
-      <p:par>
-        <p:cTn id="1" dur="indefinite" restart="never" nodeType="tmRoot"/>
-      </p:par>
-    </p:tnLst>
-  </p:timing>
 </p:sldLayout>
 </file>
 
@@ -5326,7 +5288,7 @@
           <a:p>
             <a:fld id="{5958763E-B898-436D-883D-03711491D54A}" type="datetimeFigureOut">
               <a:rPr lang="en-US" smtClean="0"/>
-              <a:t>5/11/2020</a:t>
+              <a:t>1/20/2021</a:t>
             </a:fld>
             <a:endParaRPr lang="en-US"/>
           </a:p>
@@ -5387,13 +5349,6 @@
   <p:transition>
     <p:fade/>
   </p:transition>
-  <p:timing>
-    <p:tnLst>
-      <p:par>
-        <p:cTn id="1" dur="indefinite" restart="never" nodeType="tmRoot"/>
-      </p:par>
-    </p:tnLst>
-  </p:timing>
 </p:sldLayout>
 </file>
 
@@ -5749,7 +5704,7 @@
           <a:p>
             <a:fld id="{5958763E-B898-436D-883D-03711491D54A}" type="datetimeFigureOut">
               <a:rPr lang="en-US" smtClean="0"/>
-              <a:t>5/11/2020</a:t>
+              <a:t>1/20/2021</a:t>
             </a:fld>
             <a:endParaRPr lang="en-US"/>
           </a:p>
@@ -5810,13 +5765,6 @@
   <p:transition>
     <p:fade/>
   </p:transition>
-  <p:timing>
-    <p:tnLst>
-      <p:par>
-        <p:cTn id="1" dur="indefinite" restart="never" nodeType="tmRoot"/>
-      </p:par>
-    </p:tnLst>
-  </p:timing>
 </p:sldLayout>
 </file>
 
@@ -6257,7 +6205,7 @@
           <a:p>
             <a:fld id="{5958763E-B898-436D-883D-03711491D54A}" type="datetimeFigureOut">
               <a:rPr lang="en-US" smtClean="0"/>
-              <a:t>5/11/2020</a:t>
+              <a:t>1/20/2021</a:t>
             </a:fld>
             <a:endParaRPr lang="en-US"/>
           </a:p>
@@ -6318,13 +6266,6 @@
   <p:transition>
     <p:fade/>
   </p:transition>
-  <p:timing>
-    <p:tnLst>
-      <p:par>
-        <p:cTn id="1" dur="indefinite" restart="never" nodeType="tmRoot"/>
-      </p:par>
-    </p:tnLst>
-  </p:timing>
 </p:sldLayout>
 </file>
 
@@ -6715,7 +6656,7 @@
           <a:p>
             <a:fld id="{5958763E-B898-436D-883D-03711491D54A}" type="datetimeFigureOut">
               <a:rPr lang="en-US" smtClean="0"/>
-              <a:t>5/11/2020</a:t>
+              <a:t>1/20/2021</a:t>
             </a:fld>
             <a:endParaRPr lang="en-US"/>
           </a:p>
@@ -6776,13 +6717,6 @@
   <p:transition>
     <p:fade/>
   </p:transition>
-  <p:timing>
-    <p:tnLst>
-      <p:par>
-        <p:cTn id="1" dur="indefinite" restart="never" nodeType="tmRoot"/>
-      </p:par>
-    </p:tnLst>
-  </p:timing>
 </p:sldLayout>
 </file>
 
@@ -7333,7 +7267,7 @@
           <a:p>
             <a:fld id="{5958763E-B898-436D-883D-03711491D54A}" type="datetimeFigureOut">
               <a:rPr lang="en-US" smtClean="0"/>
-              <a:t>5/11/2020</a:t>
+              <a:t>1/20/2021</a:t>
             </a:fld>
             <a:endParaRPr lang="en-US"/>
           </a:p>
@@ -7394,13 +7328,6 @@
   <p:transition>
     <p:fade/>
   </p:transition>
-  <p:timing>
-    <p:tnLst>
-      <p:par>
-        <p:cTn id="1" dur="indefinite" restart="never" nodeType="tmRoot"/>
-      </p:par>
-    </p:tnLst>
-  </p:timing>
 </p:sldLayout>
 </file>
 
@@ -8111,7 +8038,7 @@
           <a:p>
             <a:fld id="{5958763E-B898-436D-883D-03711491D54A}" type="datetimeFigureOut">
               <a:rPr lang="en-US" smtClean="0"/>
-              <a:t>5/11/2020</a:t>
+              <a:t>1/20/2021</a:t>
             </a:fld>
             <a:endParaRPr lang="en-US"/>
           </a:p>
@@ -8172,13 +8099,6 @@
   <p:transition>
     <p:fade/>
   </p:transition>
-  <p:timing>
-    <p:tnLst>
-      <p:par>
-        <p:cTn id="1" dur="indefinite" restart="never" nodeType="tmRoot"/>
-      </p:par>
-    </p:tnLst>
-  </p:timing>
 </p:sldLayout>
 </file>
 
@@ -8222,7 +8142,7 @@
           <a:p>
             <a:fld id="{5958763E-B898-436D-883D-03711491D54A}" type="datetimeFigureOut">
               <a:rPr lang="en-US" smtClean="0"/>
-              <a:t>5/11/2020</a:t>
+              <a:t>1/20/2021</a:t>
             </a:fld>
             <a:endParaRPr lang="en-US"/>
           </a:p>
@@ -8295,13 +8215,6 @@
   <p:transition>
     <p:fade/>
   </p:transition>
-  <p:timing>
-    <p:tnLst>
-      <p:par>
-        <p:cTn id="1" dur="indefinite" restart="never" nodeType="tmRoot"/>
-      </p:par>
-    </p:tnLst>
-  </p:timing>
 </p:sldLayout>
 </file>
 
@@ -8381,7 +8294,7 @@
                 <a:spcPct val="0"/>
               </a:spcAft>
             </a:pPr>
-            <a:endParaRPr lang="en-US" sz="2400" dirty="0" err="1" smtClean="0">
+            <a:endParaRPr lang="en-US" sz="2400" dirty="0" err="1">
               <a:gradFill>
                 <a:gsLst>
                   <a:gs pos="0">
@@ -8514,15 +8427,7 @@
           <a:p>
             <a:r>
               <a:rPr lang="en-US" dirty="0"/>
-              <a:t>Click to edit Master </a:t>
-            </a:r>
-            <a:r>
-              <a:rPr lang="en-US" dirty="0" smtClean="0"/>
-              <a:t>subtitle </a:t>
-            </a:r>
-            <a:r>
-              <a:rPr lang="en-US" dirty="0"/>
-              <a:t>style</a:t>
+              <a:t>Click to edit Master subtitle style</a:t>
             </a:r>
           </a:p>
         </p:txBody>
@@ -8564,7 +8469,7 @@
             <a:fld id="{1C2D31DE-C454-491C-B5C3-F097855E3DF7}" type="datetime4">
               <a:rPr lang="en-US" smtClean="0"/>
               <a:pPr/>
-              <a:t>May 11, 2020</a:t>
+              <a:t>January 20, 2021</a:t>
             </a:fld>
             <a:endParaRPr lang="en-US" dirty="0"/>
           </a:p>
@@ -11638,17 +11543,16 @@
           <a:p>
             <a:pPr lvl="0"/>
             <a:r>
-              <a:rPr lang="en-US" dirty="0" smtClean="0"/>
+              <a:rPr lang="en-US" dirty="0"/>
               <a:t>Presenter Name</a:t>
             </a:r>
             <a:br>
-              <a:rPr lang="en-US" dirty="0" smtClean="0"/>
+              <a:rPr lang="en-US" dirty="0"/>
             </a:br>
             <a:r>
-              <a:rPr lang="en-US" dirty="0" smtClean="0"/>
+              <a:rPr lang="en-US" dirty="0"/>
               <a:t>Presenter Title</a:t>
             </a:r>
-            <a:endParaRPr lang="en-US" dirty="0"/>
           </a:p>
         </p:txBody>
       </p:sp>
@@ -11665,13 +11569,6 @@
   <p:transition>
     <p:fade/>
   </p:transition>
-  <p:timing>
-    <p:tnLst>
-      <p:par>
-        <p:cTn id="1" dur="indefinite" restart="never" nodeType="tmRoot"/>
-      </p:par>
-    </p:tnLst>
-  </p:timing>
   <p:hf sldNum="0" hdr="0" ftr="0"/>
 </p:sldLayout>
 </file>
@@ -11724,7 +11621,7 @@
           <a:p>
             <a:fld id="{5958763E-B898-436D-883D-03711491D54A}" type="datetimeFigureOut">
               <a:rPr lang="en-US" smtClean="0"/>
-              <a:t>5/11/2020</a:t>
+              <a:t>1/20/2021</a:t>
             </a:fld>
             <a:endParaRPr lang="en-US"/>
           </a:p>
@@ -11797,13 +11694,6 @@
   <p:transition>
     <p:fade/>
   </p:transition>
-  <p:timing>
-    <p:tnLst>
-      <p:par>
-        <p:cTn id="1" dur="indefinite" restart="never" nodeType="tmRoot"/>
-      </p:par>
-    </p:tnLst>
-  </p:timing>
 </p:sldLayout>
 </file>
 
@@ -11855,7 +11745,7 @@
           <a:p>
             <a:fld id="{5958763E-B898-436D-883D-03711491D54A}" type="datetimeFigureOut">
               <a:rPr lang="en-US" smtClean="0"/>
-              <a:t>5/11/2020</a:t>
+              <a:t>1/20/2021</a:t>
             </a:fld>
             <a:endParaRPr lang="en-US"/>
           </a:p>
@@ -11928,13 +11818,6 @@
   <p:transition>
     <p:fade/>
   </p:transition>
-  <p:timing>
-    <p:tnLst>
-      <p:par>
-        <p:cTn id="1" dur="indefinite" restart="never" nodeType="tmRoot"/>
-      </p:par>
-    </p:tnLst>
-  </p:timing>
 </p:sldLayout>
 </file>
 
@@ -11986,7 +11869,7 @@
           <a:p>
             <a:fld id="{5958763E-B898-436D-883D-03711491D54A}" type="datetimeFigureOut">
               <a:rPr lang="en-US" smtClean="0"/>
-              <a:t>5/11/2020</a:t>
+              <a:t>1/20/2021</a:t>
             </a:fld>
             <a:endParaRPr lang="en-US"/>
           </a:p>
@@ -12059,13 +11942,6 @@
   <p:transition>
     <p:fade/>
   </p:transition>
-  <p:timing>
-    <p:tnLst>
-      <p:par>
-        <p:cTn id="1" dur="indefinite" restart="never" nodeType="tmRoot"/>
-      </p:par>
-    </p:tnLst>
-  </p:timing>
 </p:sldLayout>
 </file>
 
@@ -12117,7 +11993,7 @@
           <a:p>
             <a:fld id="{5958763E-B898-436D-883D-03711491D54A}" type="datetimeFigureOut">
               <a:rPr lang="en-US" smtClean="0"/>
-              <a:t>5/11/2020</a:t>
+              <a:t>1/20/2021</a:t>
             </a:fld>
             <a:endParaRPr lang="en-US"/>
           </a:p>
@@ -12190,13 +12066,6 @@
   <p:transition>
     <p:fade/>
   </p:transition>
-  <p:timing>
-    <p:tnLst>
-      <p:par>
-        <p:cTn id="1" dur="indefinite" restart="never" nodeType="tmRoot"/>
-      </p:par>
-    </p:tnLst>
-  </p:timing>
 </p:sldLayout>
 </file>
 
@@ -12248,7 +12117,7 @@
           <a:p>
             <a:fld id="{5958763E-B898-436D-883D-03711491D54A}" type="datetimeFigureOut">
               <a:rPr lang="en-US" smtClean="0"/>
-              <a:t>5/11/2020</a:t>
+              <a:t>1/20/2021</a:t>
             </a:fld>
             <a:endParaRPr lang="en-US"/>
           </a:p>
@@ -12321,13 +12190,6 @@
   <p:transition>
     <p:fade/>
   </p:transition>
-  <p:timing>
-    <p:tnLst>
-      <p:par>
-        <p:cTn id="1" dur="indefinite" restart="never" nodeType="tmRoot"/>
-      </p:par>
-    </p:tnLst>
-  </p:timing>
 </p:sldLayout>
 </file>
 
@@ -12379,7 +12241,7 @@
           <a:p>
             <a:fld id="{5958763E-B898-436D-883D-03711491D54A}" type="datetimeFigureOut">
               <a:rPr lang="en-US" smtClean="0"/>
-              <a:t>5/11/2020</a:t>
+              <a:t>1/20/2021</a:t>
             </a:fld>
             <a:endParaRPr lang="en-US"/>
           </a:p>
@@ -12452,13 +12314,6 @@
   <p:transition>
     <p:fade/>
   </p:transition>
-  <p:timing>
-    <p:tnLst>
-      <p:par>
-        <p:cTn id="1" dur="indefinite" restart="never" nodeType="tmRoot"/>
-      </p:par>
-    </p:tnLst>
-  </p:timing>
 </p:sldLayout>
 </file>
 
@@ -12510,7 +12365,7 @@
           <a:p>
             <a:fld id="{5958763E-B898-436D-883D-03711491D54A}" type="datetimeFigureOut">
               <a:rPr lang="en-US" smtClean="0"/>
-              <a:t>5/11/2020</a:t>
+              <a:t>1/20/2021</a:t>
             </a:fld>
             <a:endParaRPr lang="en-US"/>
           </a:p>
@@ -12583,13 +12438,6 @@
   <p:transition>
     <p:fade/>
   </p:transition>
-  <p:timing>
-    <p:tnLst>
-      <p:par>
-        <p:cTn id="1" dur="indefinite" restart="never" nodeType="tmRoot"/>
-      </p:par>
-    </p:tnLst>
-  </p:timing>
 </p:sldLayout>
 </file>
 
@@ -12641,7 +12489,7 @@
           <a:p>
             <a:fld id="{5958763E-B898-436D-883D-03711491D54A}" type="datetimeFigureOut">
               <a:rPr lang="en-US" smtClean="0"/>
-              <a:t>5/11/2020</a:t>
+              <a:t>1/20/2021</a:t>
             </a:fld>
             <a:endParaRPr lang="en-US"/>
           </a:p>
@@ -12714,13 +12562,6 @@
   <p:transition>
     <p:fade/>
   </p:transition>
-  <p:timing>
-    <p:tnLst>
-      <p:par>
-        <p:cTn id="1" dur="indefinite" restart="never" nodeType="tmRoot"/>
-      </p:par>
-    </p:tnLst>
-  </p:timing>
 </p:sldLayout>
 </file>
 
@@ -12781,7 +12622,7 @@
           <a:p>
             <a:fld id="{5958763E-B898-436D-883D-03711491D54A}" type="datetimeFigureOut">
               <a:rPr lang="en-US" smtClean="0"/>
-              <a:t>5/11/2020</a:t>
+              <a:t>1/20/2021</a:t>
             </a:fld>
             <a:endParaRPr lang="en-US"/>
           </a:p>
@@ -12854,13 +12695,6 @@
   <p:transition>
     <p:fade/>
   </p:transition>
-  <p:timing>
-    <p:tnLst>
-      <p:par>
-        <p:cTn id="1" dur="indefinite" restart="never" nodeType="tmRoot"/>
-      </p:par>
-    </p:tnLst>
-  </p:timing>
 </p:sldLayout>
 </file>
 
@@ -15862,13 +15696,6 @@
   <p:transition>
     <p:fade/>
   </p:transition>
-  <p:timing>
-    <p:tnLst>
-      <p:par>
-        <p:cTn id="1" dur="indefinite" restart="never" nodeType="tmRoot"/>
-      </p:par>
-    </p:tnLst>
-  </p:timing>
 </p:sldLayout>
 </file>
 
@@ -15956,7 +15783,7 @@
                 <a:spcPct val="0"/>
               </a:spcAft>
             </a:pPr>
-            <a:endParaRPr lang="en-US" sz="2400" dirty="0" err="1" smtClean="0">
+            <a:endParaRPr lang="en-US" sz="2400" dirty="0" err="1">
               <a:gradFill>
                 <a:gsLst>
                   <a:gs pos="0">
@@ -16092,15 +15919,7 @@
           <a:p>
             <a:r>
               <a:rPr lang="en-US" dirty="0"/>
-              <a:t>Click to edit Master </a:t>
-            </a:r>
-            <a:r>
-              <a:rPr lang="en-US" dirty="0" smtClean="0"/>
-              <a:t>subtitle </a:t>
-            </a:r>
-            <a:r>
-              <a:rPr lang="en-US" dirty="0"/>
-              <a:t>style</a:t>
+              <a:t>Click to edit Master subtitle style</a:t>
             </a:r>
           </a:p>
         </p:txBody>
@@ -16142,7 +15961,7 @@
             <a:fld id="{1C2D31DE-C454-491C-B5C3-F097855E3DF7}" type="datetime4">
               <a:rPr lang="en-US" smtClean="0"/>
               <a:pPr/>
-              <a:t>May 11, 2020</a:t>
+              <a:t>January 20, 2021</a:t>
             </a:fld>
             <a:endParaRPr lang="en-US" dirty="0"/>
           </a:p>
@@ -19224,17 +19043,16 @@
           <a:p>
             <a:pPr lvl="0"/>
             <a:r>
-              <a:rPr lang="en-US" dirty="0" smtClean="0"/>
+              <a:rPr lang="en-US" dirty="0"/>
               <a:t>Presenter Name</a:t>
             </a:r>
             <a:br>
-              <a:rPr lang="en-US" dirty="0" smtClean="0"/>
+              <a:rPr lang="en-US" dirty="0"/>
             </a:br>
             <a:r>
-              <a:rPr lang="en-US" dirty="0" smtClean="0"/>
+              <a:rPr lang="en-US" dirty="0"/>
               <a:t>Presenter Title</a:t>
             </a:r>
-            <a:endParaRPr lang="en-US" dirty="0"/>
           </a:p>
         </p:txBody>
       </p:sp>
@@ -19251,13 +19069,6 @@
   <p:transition>
     <p:fade/>
   </p:transition>
-  <p:timing>
-    <p:tnLst>
-      <p:par>
-        <p:cTn id="1" dur="indefinite" restart="never" nodeType="tmRoot"/>
-      </p:par>
-    </p:tnLst>
-  </p:timing>
   <p:hf sldNum="0" hdr="0" ftr="0"/>
 </p:sldLayout>
 </file>
@@ -26767,10 +26578,9 @@
           <a:p>
             <a:pPr lvl="0"/>
             <a:r>
-              <a:rPr lang="en-US" dirty="0" smtClean="0"/>
+              <a:rPr lang="en-US" dirty="0"/>
               <a:t>&lt;Call to action&gt;</a:t>
             </a:r>
-            <a:endParaRPr lang="en-US" dirty="0"/>
           </a:p>
         </p:txBody>
       </p:sp>
@@ -28387,7 +28197,7 @@
           <a:p>
             <a:fld id="{5958763E-B898-436D-883D-03711491D54A}" type="datetimeFigureOut">
               <a:rPr lang="en-US" smtClean="0"/>
-              <a:t>5/11/2020</a:t>
+              <a:t>1/20/2021</a:t>
             </a:fld>
             <a:endParaRPr lang="en-US"/>
           </a:p>
@@ -28514,7 +28324,7 @@
                 <a:spcPct val="0"/>
               </a:spcAft>
             </a:pPr>
-            <a:endParaRPr lang="en-US" sz="2400" dirty="0" err="1" smtClean="0">
+            <a:endParaRPr lang="en-US" sz="2400" dirty="0" err="1">
               <a:gradFill>
                 <a:gsLst>
                   <a:gs pos="0">
@@ -28545,13 +28355,6 @@
   <p:transition>
     <p:fade/>
   </p:transition>
-  <p:timing>
-    <p:tnLst>
-      <p:par>
-        <p:cTn id="1" dur="indefinite" restart="never" nodeType="tmRoot"/>
-      </p:par>
-    </p:tnLst>
-  </p:timing>
 </p:sldLayout>
 </file>
 
@@ -28796,7 +28599,7 @@
           <a:p>
             <a:fld id="{5958763E-B898-436D-883D-03711491D54A}" type="datetimeFigureOut">
               <a:rPr lang="en-US" smtClean="0"/>
-              <a:t>5/11/2020</a:t>
+              <a:t>1/20/2021</a:t>
             </a:fld>
             <a:endParaRPr lang="en-US"/>
           </a:p>
@@ -28869,13 +28672,6 @@
   <p:transition>
     <p:fade/>
   </p:transition>
-  <p:timing>
-    <p:tnLst>
-      <p:par>
-        <p:cTn id="1" dur="indefinite" restart="never" nodeType="tmRoot"/>
-      </p:par>
-    </p:tnLst>
-  </p:timing>
 </p:sldLayout>
 </file>
 
@@ -29097,7 +28893,7 @@
           <a:p>
             <a:fld id="{5958763E-B898-436D-883D-03711491D54A}" type="datetimeFigureOut">
               <a:rPr lang="en-US" smtClean="0"/>
-              <a:t>5/11/2020</a:t>
+              <a:t>1/20/2021</a:t>
             </a:fld>
             <a:endParaRPr lang="en-US"/>
           </a:p>
@@ -29170,13 +28966,6 @@
   <p:transition>
     <p:fade/>
   </p:transition>
-  <p:timing>
-    <p:tnLst>
-      <p:par>
-        <p:cTn id="1" dur="indefinite" restart="never" nodeType="tmRoot"/>
-      </p:par>
-    </p:tnLst>
-  </p:timing>
 </p:sldLayout>
 </file>
 
@@ -29305,7 +29094,7 @@
           <a:p>
             <a:fld id="{5958763E-B898-436D-883D-03711491D54A}" type="datetimeFigureOut">
               <a:rPr lang="en-US" smtClean="0"/>
-              <a:t>5/11/2020</a:t>
+              <a:t>1/20/2021</a:t>
             </a:fld>
             <a:endParaRPr lang="en-US"/>
           </a:p>
@@ -29428,13 +29217,6 @@
   <p:transition>
     <p:fade/>
   </p:transition>
-  <p:timing>
-    <p:tnLst>
-      <p:par>
-        <p:cTn id="1" dur="indefinite" restart="never" nodeType="tmRoot"/>
-      </p:par>
-    </p:tnLst>
-  </p:timing>
 </p:sldLayout>
 </file>
 
@@ -29573,7 +29355,7 @@
           <a:p>
             <a:fld id="{5958763E-B898-436D-883D-03711491D54A}" type="datetimeFigureOut">
               <a:rPr lang="en-US" smtClean="0"/>
-              <a:t>5/11/2020</a:t>
+              <a:t>1/20/2021</a:t>
             </a:fld>
             <a:endParaRPr lang="en-US"/>
           </a:p>
@@ -29700,13 +29482,6 @@
   <p:transition>
     <p:fade/>
   </p:transition>
-  <p:timing>
-    <p:tnLst>
-      <p:par>
-        <p:cTn id="1" dur="indefinite" restart="never" nodeType="tmRoot"/>
-      </p:par>
-    </p:tnLst>
-  </p:timing>
 </p:sldLayout>
 </file>
 
@@ -29845,7 +29620,7 @@
           <a:p>
             <a:pPr lvl="0"/>
             <a:r>
-              <a:rPr lang="en-US" smtClean="0"/>
+              <a:rPr lang="en-US"/>
               <a:t>Edit Master text styles</a:t>
             </a:r>
           </a:p>
@@ -29916,35 +29691,35 @@
           <a:p>
             <a:pPr lvl="0"/>
             <a:r>
-              <a:rPr lang="en-US" smtClean="0"/>
+              <a:rPr lang="en-US"/>
               <a:t>Edit Master text styles</a:t>
             </a:r>
           </a:p>
           <a:p>
             <a:pPr lvl="1"/>
             <a:r>
-              <a:rPr lang="en-US" smtClean="0"/>
+              <a:rPr lang="en-US"/>
               <a:t>Second level</a:t>
             </a:r>
           </a:p>
           <a:p>
             <a:pPr lvl="2"/>
             <a:r>
-              <a:rPr lang="en-US" smtClean="0"/>
+              <a:rPr lang="en-US"/>
               <a:t>Third level</a:t>
             </a:r>
           </a:p>
           <a:p>
             <a:pPr lvl="3"/>
             <a:r>
-              <a:rPr lang="en-US" smtClean="0"/>
+              <a:rPr lang="en-US"/>
               <a:t>Fourth level</a:t>
             </a:r>
           </a:p>
           <a:p>
             <a:pPr lvl="4"/>
             <a:r>
-              <a:rPr lang="en-US" smtClean="0"/>
+              <a:rPr lang="en-US"/>
               <a:t>Fifth level</a:t>
             </a:r>
             <a:endParaRPr lang="en-US" dirty="0"/>
@@ -29961,14 +29736,7 @@
   <p:clrMapOvr>
     <a:masterClrMapping/>
   </p:clrMapOvr>
-  <p:timing>
-    <p:tnLst>
-      <p:par>
-        <p:cTn id="1" dur="indefinite" restart="never" nodeType="tmRoot"/>
-      </p:par>
-    </p:tnLst>
-  </p:timing>
-  <p:extLst mod="1">
+  <p:extLst>
     <p:ext uri="{DCECCB84-F9BA-43D5-87BE-67443E8EF086}">
       <p15:sldGuideLst xmlns:p15="http://schemas.microsoft.com/office/powerpoint/2012/main">
         <p15:guide id="1" orient="horz" pos="2160">
@@ -30145,7 +29913,7 @@
                 <a:spcPct val="0"/>
               </a:spcAft>
             </a:pPr>
-            <a:endParaRPr lang="en-US" sz="2400" dirty="0" err="1" smtClean="0">
+            <a:endParaRPr lang="en-US" sz="2400" dirty="0" err="1">
               <a:gradFill>
                 <a:gsLst>
                   <a:gs pos="0">
@@ -30196,10 +29964,9 @@
           </a:lstStyle>
           <a:p>
             <a:r>
-              <a:rPr lang="en-US" dirty="0" smtClean="0"/>
+              <a:rPr lang="en-US" dirty="0"/>
               <a:t>Type “Agenda”</a:t>
             </a:r>
-            <a:endParaRPr lang="en-US" dirty="0"/>
           </a:p>
         </p:txBody>
       </p:sp>
@@ -30323,24 +30090,23 @@
           <a:p>
             <a:pPr lvl="0"/>
             <a:r>
-              <a:rPr lang="en-US" dirty="0" smtClean="0"/>
+              <a:rPr lang="en-US" dirty="0"/>
               <a:t>Item 1</a:t>
             </a:r>
           </a:p>
           <a:p>
             <a:pPr lvl="0"/>
             <a:r>
-              <a:rPr lang="en-US" dirty="0" smtClean="0"/>
+              <a:rPr lang="en-US" dirty="0"/>
               <a:t>Item 2</a:t>
             </a:r>
           </a:p>
           <a:p>
             <a:pPr lvl="0"/>
             <a:r>
-              <a:rPr lang="en-US" dirty="0" smtClean="0"/>
+              <a:rPr lang="en-US" dirty="0"/>
               <a:t>Item 3</a:t>
             </a:r>
-            <a:endParaRPr lang="en-US" dirty="0"/>
           </a:p>
         </p:txBody>
       </p:sp>
@@ -30367,7 +30133,7 @@
           <a:p>
             <a:fld id="{5958763E-B898-436D-883D-03711491D54A}" type="datetimeFigureOut">
               <a:rPr lang="en-US" smtClean="0"/>
-              <a:t>5/11/2020</a:t>
+              <a:t>1/20/2021</a:t>
             </a:fld>
             <a:endParaRPr lang="en-US"/>
           </a:p>
@@ -30474,13 +30240,6 @@
   <p:transition>
     <p:fade/>
   </p:transition>
-  <p:timing>
-    <p:tnLst>
-      <p:par>
-        <p:cTn id="1" dur="indefinite" restart="never" nodeType="tmRoot"/>
-      </p:par>
-    </p:tnLst>
-  </p:timing>
 </p:sldLayout>
 </file>
 
@@ -30642,7 +30401,7 @@
                 <a:spcPct val="0"/>
               </a:spcAft>
             </a:pPr>
-            <a:endParaRPr lang="en-US" sz="2400" dirty="0" err="1" smtClean="0">
+            <a:endParaRPr lang="en-US" sz="2400" dirty="0" err="1">
               <a:gradFill>
                 <a:gsLst>
                   <a:gs pos="0">
@@ -30695,10 +30454,9 @@
           </a:lstStyle>
           <a:p>
             <a:r>
-              <a:rPr lang="en-US" dirty="0" smtClean="0"/>
+              <a:rPr lang="en-US" dirty="0"/>
               <a:t>Notable Quote</a:t>
             </a:r>
-            <a:endParaRPr lang="en-US" dirty="0"/>
           </a:p>
         </p:txBody>
       </p:sp>
@@ -30825,10 +30583,9 @@
           <a:p>
             <a:pPr lvl="0"/>
             <a:r>
-              <a:rPr lang="en-US" dirty="0" smtClean="0"/>
+              <a:rPr lang="en-US" dirty="0"/>
               <a:t>– Attribution</a:t>
             </a:r>
-            <a:endParaRPr lang="en-US" dirty="0"/>
           </a:p>
         </p:txBody>
       </p:sp>
@@ -30855,7 +30612,7 @@
           <a:p>
             <a:fld id="{5958763E-B898-436D-883D-03711491D54A}" type="datetimeFigureOut">
               <a:rPr lang="en-US" smtClean="0"/>
-              <a:t>5/11/2020</a:t>
+              <a:t>1/20/2021</a:t>
             </a:fld>
             <a:endParaRPr lang="en-US"/>
           </a:p>
@@ -31603,13 +31360,6 @@
   <p:transition>
     <p:fade/>
   </p:transition>
-  <p:timing>
-    <p:tnLst>
-      <p:par>
-        <p:cTn id="1" dur="indefinite" restart="never" nodeType="tmRoot"/>
-      </p:par>
-    </p:tnLst>
-  </p:timing>
 </p:sldLayout>
 </file>
 
@@ -31681,7 +31431,7 @@
           <a:p>
             <a:fld id="{5958763E-B898-436D-883D-03711491D54A}" type="datetimeFigureOut">
               <a:rPr lang="en-US" smtClean="0"/>
-              <a:t>5/11/2020</a:t>
+              <a:t>1/20/2021</a:t>
             </a:fld>
             <a:endParaRPr lang="en-US"/>
           </a:p>
@@ -31754,13 +31504,6 @@
   <p:transition>
     <p:fade/>
   </p:transition>
-  <p:timing>
-    <p:tnLst>
-      <p:par>
-        <p:cTn id="1" dur="indefinite" restart="never" nodeType="tmRoot"/>
-      </p:par>
-    </p:tnLst>
-  </p:timing>
 </p:sldLayout>
 </file>
 
@@ -31889,7 +31632,7 @@
           <a:p>
             <a:fld id="{5958763E-B898-436D-883D-03711491D54A}" type="datetimeFigureOut">
               <a:rPr lang="en-US" smtClean="0"/>
-              <a:t>5/11/2020</a:t>
+              <a:t>1/20/2021</a:t>
             </a:fld>
             <a:endParaRPr lang="en-US"/>
           </a:p>
@@ -32012,13 +31755,6 @@
   <p:transition>
     <p:fade/>
   </p:transition>
-  <p:timing>
-    <p:tnLst>
-      <p:par>
-        <p:cTn id="1" dur="indefinite" restart="never" nodeType="tmRoot"/>
-      </p:par>
-    </p:tnLst>
-  </p:timing>
 </p:sldLayout>
 </file>
 
@@ -32231,7 +31967,7 @@
           <a:p>
             <a:fld id="{5958763E-B898-436D-883D-03711491D54A}" type="datetimeFigureOut">
               <a:rPr lang="en-US" smtClean="0"/>
-              <a:t>5/11/2020</a:t>
+              <a:t>1/20/2021</a:t>
             </a:fld>
             <a:endParaRPr lang="en-US"/>
           </a:p>
@@ -32304,13 +32040,6 @@
   <p:transition>
     <p:fade/>
   </p:transition>
-  <p:timing>
-    <p:tnLst>
-      <p:par>
-        <p:cTn id="1" dur="indefinite" restart="never" nodeType="tmRoot"/>
-      </p:par>
-    </p:tnLst>
-  </p:timing>
 </p:sldLayout>
 </file>
 
@@ -32468,7 +32197,7 @@
           <a:p>
             <a:fld id="{5958763E-B898-436D-883D-03711491D54A}" type="datetimeFigureOut">
               <a:rPr lang="en-US" smtClean="0"/>
-              <a:t>5/11/2020</a:t>
+              <a:t>1/20/2021</a:t>
             </a:fld>
             <a:endParaRPr lang="en-US"/>
           </a:p>
@@ -32541,13 +32270,6 @@
   <p:transition>
     <p:fade/>
   </p:transition>
-  <p:timing>
-    <p:tnLst>
-      <p:par>
-        <p:cTn id="1" dur="indefinite" restart="never" nodeType="tmRoot"/>
-      </p:par>
-    </p:tnLst>
-  </p:timing>
 </p:sldLayout>
 </file>
 
@@ -32719,7 +32441,7 @@
           <a:p>
             <a:fld id="{5958763E-B898-436D-883D-03711491D54A}" type="datetimeFigureOut">
               <a:rPr lang="en-US" smtClean="0"/>
-              <a:t>5/11/2020</a:t>
+              <a:t>1/20/2021</a:t>
             </a:fld>
             <a:endParaRPr lang="en-US"/>
           </a:p>
@@ -32866,13 +32588,6 @@
   <p:transition>
     <p:fade/>
   </p:transition>
-  <p:timing>
-    <p:tnLst>
-      <p:par>
-        <p:cTn id="1" dur="indefinite" restart="never" nodeType="tmRoot"/>
-      </p:par>
-    </p:tnLst>
-  </p:timing>
   <p:txStyles>
     <p:titleStyle>
       <a:lvl1pPr algn="l" defTabSz="914400" rtl="0" eaLnBrk="1" latinLnBrk="0" hangingPunct="1">
@@ -33177,7 +32892,7 @@
       </a:lvl9pPr>
     </p:otherStyle>
   </p:txStyles>
-  <p:extLst mod="1">
+  <p:extLst>
     <p:ext uri="{27BBF7A9-308A-43DC-89C8-2F10F3537804}">
       <p15:sldGuideLst xmlns:p15="http://schemas.microsoft.com/office/powerpoint/2012/main">
         <p15:guide id="1" orient="horz" pos="2160" userDrawn="1">
@@ -33256,10 +32971,9 @@
           <a:lstStyle/>
           <a:p>
             <a:r>
-              <a:rPr lang="en-US" sz="6600" dirty="0" smtClean="0"/>
+              <a:rPr lang="en-US" sz="6600" dirty="0"/>
               <a:t>Command Line</a:t>
             </a:r>
-            <a:endParaRPr lang="en-US" sz="6600" dirty="0"/>
           </a:p>
         </p:txBody>
       </p:sp>
@@ -33284,10 +32998,9 @@
           <a:lstStyle/>
           <a:p>
             <a:r>
-              <a:rPr lang="en-US" dirty="0" smtClean="0"/>
+              <a:rPr lang="en-US" dirty="0"/>
               <a:t>Hy-Tech Club: Web 201</a:t>
             </a:r>
-            <a:endParaRPr lang="en-US" dirty="0"/>
           </a:p>
         </p:txBody>
       </p:sp>
@@ -36272,13 +35985,6 @@
   <p:transition>
     <p:fade/>
   </p:transition>
-  <p:timing>
-    <p:tnLst>
-      <p:par>
-        <p:cTn id="1" dur="indefinite" restart="never" nodeType="tmRoot"/>
-      </p:par>
-    </p:tnLst>
-  </p:timing>
 </p:sld>
 </file>
 
@@ -36315,10 +36021,9 @@
           <a:lstStyle/>
           <a:p>
             <a:r>
-              <a:rPr lang="en-US" dirty="0" smtClean="0"/>
+              <a:rPr lang="en-US" dirty="0"/>
               <a:t>Paths</a:t>
             </a:r>
-            <a:endParaRPr lang="en-US" dirty="0"/>
           </a:p>
         </p:txBody>
       </p:sp>
@@ -36983,10 +36688,9 @@
           <a:lstStyle/>
           <a:p>
             <a:r>
-              <a:rPr lang="en-US" dirty="0" smtClean="0"/>
+              <a:rPr lang="en-US" dirty="0"/>
               <a:t>MINI-Quiz: What would happen?</a:t>
             </a:r>
-            <a:endParaRPr lang="en-US" dirty="0"/>
           </a:p>
         </p:txBody>
       </p:sp>
@@ -37008,7 +36712,7 @@
             <a:pPr marL="57150" indent="0" algn="ctr">
               <a:buNone/>
             </a:pPr>
-            <a:endParaRPr lang="en-US" sz="9600" dirty="0" smtClean="0">
+            <a:endParaRPr lang="en-US" sz="9600" dirty="0">
               <a:solidFill>
                 <a:schemeClr val="bg1"/>
               </a:solidFill>
@@ -37020,7 +36724,7 @@
               <a:buNone/>
             </a:pPr>
             <a:r>
-              <a:rPr lang="en-US" sz="13800" dirty="0" smtClean="0">
+              <a:rPr lang="en-US" sz="13800" dirty="0">
                 <a:solidFill>
                   <a:schemeClr val="bg1"/>
                 </a:solidFill>
@@ -37028,12 +36732,6 @@
               </a:rPr>
               <a:t>cd ../..</a:t>
             </a:r>
-            <a:endParaRPr lang="en-US" sz="13800" dirty="0">
-              <a:solidFill>
-                <a:schemeClr val="bg1"/>
-              </a:solidFill>
-              <a:latin typeface="Consolas" panose="020B0609020204030204" pitchFamily="49" charset="0"/>
-            </a:endParaRPr>
           </a:p>
         </p:txBody>
       </p:sp>
@@ -37050,13 +36748,6 @@
   <p:transition>
     <p:fade/>
   </p:transition>
-  <p:timing>
-    <p:tnLst>
-      <p:par>
-        <p:cTn id="1" dur="indefinite" restart="never" nodeType="tmRoot"/>
-      </p:par>
-    </p:tnLst>
-  </p:timing>
 </p:sld>
 </file>
 
@@ -37093,10 +36784,9 @@
           <a:lstStyle/>
           <a:p>
             <a:r>
-              <a:rPr lang="en-US" dirty="0" smtClean="0"/>
+              <a:rPr lang="en-US" dirty="0"/>
               <a:t>Helpful Tips</a:t>
             </a:r>
-            <a:endParaRPr lang="en-US" dirty="0"/>
           </a:p>
         </p:txBody>
       </p:sp>
@@ -37120,20 +36810,16 @@
           <a:bodyPr/>
           <a:lstStyle/>
           <a:p>
-            <a:endParaRPr lang="en-US" b="1" dirty="0" smtClean="0"/>
+            <a:endParaRPr lang="en-US" b="1" dirty="0"/>
           </a:p>
           <a:p>
             <a:r>
-              <a:rPr lang="en-US" b="1" dirty="0" smtClean="0"/>
+              <a:rPr lang="en-US" b="1" dirty="0"/>
               <a:t>TAB</a:t>
             </a:r>
             <a:r>
-              <a:rPr lang="en-US" dirty="0" smtClean="0"/>
-              <a:t> </a:t>
-            </a:r>
-            <a:r>
               <a:rPr lang="en-US" dirty="0"/>
-              <a:t>– When typing out a command, pressing the TAB key will attempt to auto-complete it</a:t>
+              <a:t> – When typing out a command, pressing the TAB key will attempt to auto-complete it</a:t>
             </a:r>
           </a:p>
           <a:p>
@@ -37180,13 +36866,67 @@
   <p:transition>
     <p:fade/>
   </p:transition>
-  <p:timing>
-    <p:tnLst>
-      <p:par>
-        <p:cTn id="1" dur="indefinite" restart="never" nodeType="tmRoot"/>
-      </p:par>
-    </p:tnLst>
-  </p:timing>
+</p:sld>
+</file>
+
+<file path=ppt/slides/slide13.xml><?xml version="1.0" encoding="utf-8"?>
+<p:sld xmlns:a="http://schemas.openxmlformats.org/drawingml/2006/main" xmlns:r="http://schemas.openxmlformats.org/officeDocument/2006/relationships" xmlns:p="http://schemas.openxmlformats.org/presentationml/2006/main">
+  <p:cSld>
+    <p:spTree>
+      <p:nvGrpSpPr>
+        <p:cNvPr id="1" name=""/>
+        <p:cNvGrpSpPr/>
+        <p:nvPr/>
+      </p:nvGrpSpPr>
+      <p:grpSpPr>
+        <a:xfrm>
+          <a:off x="0" y="0"/>
+          <a:ext cx="0" cy="0"/>
+          <a:chOff x="0" y="0"/>
+          <a:chExt cx="0" cy="0"/>
+        </a:xfrm>
+      </p:grpSpPr>
+      <p:sp>
+        <p:nvSpPr>
+          <p:cNvPr id="2" name="Text Placeholder 1">
+            <a:extLst>
+              <a:ext uri="{FF2B5EF4-FFF2-40B4-BE49-F238E27FC236}">
+                <a16:creationId xmlns:a16="http://schemas.microsoft.com/office/drawing/2014/main" id="{77C4D0E2-88AC-4F0F-8FE0-C755FFA96EF9}"/>
+              </a:ext>
+            </a:extLst>
+          </p:cNvPr>
+          <p:cNvSpPr>
+            <a:spLocks noGrp="1"/>
+          </p:cNvSpPr>
+          <p:nvPr>
+            <p:ph type="body" sz="quarter" idx="10"/>
+          </p:nvPr>
+        </p:nvSpPr>
+        <p:spPr/>
+        <p:txBody>
+          <a:bodyPr/>
+          <a:lstStyle/>
+          <a:p>
+            <a:r>
+              <a:rPr lang="en-US"/>
+              <a:t>Questions?</a:t>
+            </a:r>
+          </a:p>
+        </p:txBody>
+      </p:sp>
+    </p:spTree>
+    <p:extLst>
+      <p:ext uri="{BB962C8B-B14F-4D97-AF65-F5344CB8AC3E}">
+        <p14:creationId xmlns:p14="http://schemas.microsoft.com/office/powerpoint/2010/main" val="385440431"/>
+      </p:ext>
+    </p:extLst>
+  </p:cSld>
+  <p:clrMapOvr>
+    <a:masterClrMapping/>
+  </p:clrMapOvr>
+  <p:transition>
+    <p:fade/>
+  </p:transition>
 </p:sld>
 </file>
 
@@ -37223,10 +36963,9 @@
           <a:lstStyle/>
           <a:p>
             <a:r>
-              <a:rPr lang="en-US" dirty="0" smtClean="0"/>
+              <a:rPr lang="en-US" dirty="0"/>
               <a:t>Agenda</a:t>
             </a:r>
-            <a:endParaRPr lang="en-US" dirty="0"/>
           </a:p>
         </p:txBody>
       </p:sp>
@@ -37246,13 +36985,13 @@
           <a:lstStyle/>
           <a:p>
             <a:r>
-              <a:rPr lang="en-US" dirty="0" smtClean="0"/>
+              <a:rPr lang="en-US" dirty="0"/>
               <a:t>Background</a:t>
             </a:r>
           </a:p>
           <a:p>
             <a:r>
-              <a:rPr lang="en-US" dirty="0" smtClean="0"/>
+              <a:rPr lang="en-US" dirty="0"/>
               <a:t>Commands</a:t>
             </a:r>
           </a:p>
@@ -37271,13 +37010,6 @@
   <p:transition>
     <p:fade/>
   </p:transition>
-  <p:timing>
-    <p:tnLst>
-      <p:par>
-        <p:cTn id="1" dur="indefinite" restart="never" nodeType="tmRoot"/>
-      </p:par>
-    </p:tnLst>
-  </p:timing>
 </p:sld>
 </file>
 
@@ -37337,13 +37069,6 @@
   <p:transition>
     <p:fade/>
   </p:transition>
-  <p:timing>
-    <p:tnLst>
-      <p:par>
-        <p:cTn id="1" dur="indefinite" restart="never" nodeType="tmRoot"/>
-      </p:par>
-    </p:tnLst>
-  </p:timing>
 </p:sld>
 </file>
 
@@ -37380,11 +37105,11 @@
           <a:lstStyle/>
           <a:p>
             <a:r>
-              <a:rPr lang="en-US" dirty="0" smtClean="0"/>
+              <a:rPr lang="en-US" dirty="0"/>
               <a:t>Before The </a:t>
             </a:r>
             <a:r>
-              <a:rPr lang="en-US" dirty="0" err="1" smtClean="0"/>
+              <a:rPr lang="en-US" dirty="0" err="1"/>
               <a:t>Gui</a:t>
             </a:r>
             <a:endParaRPr lang="en-US" dirty="0"/>
@@ -37412,12 +37137,8 @@
           <a:lstStyle/>
           <a:p>
             <a:r>
-              <a:rPr lang="en-US" u="sng" dirty="0" smtClean="0"/>
-              <a:t>Command-Line </a:t>
-            </a:r>
-            <a:r>
               <a:rPr lang="en-US" u="sng" dirty="0"/>
-              <a:t>Interfaces</a:t>
+              <a:t>Command-Line Interfaces</a:t>
             </a:r>
             <a:r>
               <a:rPr lang="en-US" dirty="0"/>
@@ -37429,11 +37150,7 @@
             </a:r>
             <a:r>
               <a:rPr lang="en-US" dirty="0"/>
-              <a:t>) were once the primary means of computer </a:t>
-            </a:r>
-            <a:r>
-              <a:rPr lang="en-US" dirty="0" smtClean="0"/>
-              <a:t>interaction</a:t>
+              <a:t>) were once the primary means of computer interaction</a:t>
             </a:r>
           </a:p>
           <a:p>
@@ -37454,11 +37171,7 @@
             </a:r>
             <a:r>
               <a:rPr lang="en-US" dirty="0"/>
-              <a:t>): the modern-day visual programs we all know and </a:t>
-            </a:r>
-            <a:r>
-              <a:rPr lang="en-US" dirty="0" smtClean="0"/>
-              <a:t>love</a:t>
+              <a:t>): the modern-day visual programs we all know and love</a:t>
             </a:r>
           </a:p>
           <a:p>
@@ -37748,10 +37461,9 @@
           <a:lstStyle/>
           <a:p>
             <a:r>
-              <a:rPr lang="en-US" dirty="0" smtClean="0"/>
+              <a:rPr lang="en-US" dirty="0"/>
               <a:t>Bash</a:t>
             </a:r>
-            <a:endParaRPr lang="en-US" dirty="0"/>
           </a:p>
         </p:txBody>
       </p:sp>
@@ -37770,24 +37482,16 @@
           <a:bodyPr/>
           <a:lstStyle/>
           <a:p>
-            <a:endParaRPr lang="en-US" u="sng" dirty="0" smtClean="0"/>
+            <a:endParaRPr lang="en-US" u="sng" dirty="0"/>
           </a:p>
           <a:p>
             <a:r>
-              <a:rPr lang="en-US" u="sng" dirty="0" smtClean="0"/>
+              <a:rPr lang="en-US" u="sng" dirty="0"/>
               <a:t>Shell</a:t>
             </a:r>
             <a:r>
-              <a:rPr lang="en-US" dirty="0" smtClean="0"/>
-              <a:t> </a:t>
-            </a:r>
-            <a:r>
               <a:rPr lang="en-US" dirty="0"/>
-              <a:t>programs allow you to run a variety of commands on your </a:t>
-            </a:r>
-            <a:r>
-              <a:rPr lang="en-US" dirty="0" smtClean="0"/>
-              <a:t>computer</a:t>
+              <a:t> programs allow you to run a variety of commands on your computer</a:t>
             </a:r>
           </a:p>
           <a:p>
@@ -37808,11 +37512,7 @@
             </a:r>
             <a:r>
               <a:rPr lang="en-US" dirty="0"/>
-              <a:t> and command language, and is the default shell on Linux and OS </a:t>
-            </a:r>
-            <a:r>
-              <a:rPr lang="en-US" dirty="0" smtClean="0"/>
-              <a:t>X</a:t>
+              <a:t> and command language, and is the default shell on Linux and OS X</a:t>
             </a:r>
           </a:p>
           <a:p>
@@ -38110,10 +37810,9 @@
           <a:lstStyle/>
           <a:p>
             <a:r>
-              <a:rPr lang="en-US" dirty="0" smtClean="0"/>
+              <a:rPr lang="en-US" dirty="0"/>
               <a:t>What does it look like?</a:t>
             </a:r>
-            <a:endParaRPr lang="en-US" dirty="0"/>
           </a:p>
         </p:txBody>
       </p:sp>
@@ -38303,18 +38002,13 @@
           <a:lstStyle/>
           <a:p>
             <a:r>
-              <a:rPr lang="en-US" dirty="0" smtClean="0">
+              <a:rPr lang="en-US" dirty="0">
                 <a:solidFill>
                   <a:srgbClr val="E95EBE"/>
                 </a:solidFill>
               </a:rPr>
               <a:t>Command example</a:t>
             </a:r>
-            <a:endParaRPr lang="en-US" dirty="0">
-              <a:solidFill>
-                <a:srgbClr val="E95EBE"/>
-              </a:solidFill>
-            </a:endParaRPr>
           </a:p>
         </p:txBody>
       </p:sp>
@@ -38396,18 +38090,13 @@
           <a:lstStyle/>
           <a:p>
             <a:r>
-              <a:rPr lang="en-US" dirty="0" smtClean="0">
+              <a:rPr lang="en-US" dirty="0">
                 <a:solidFill>
                   <a:srgbClr val="FFFF00"/>
                 </a:solidFill>
               </a:rPr>
               <a:t>Command output</a:t>
             </a:r>
-            <a:endParaRPr lang="en-US" dirty="0">
-              <a:solidFill>
-                <a:srgbClr val="FFFF00"/>
-              </a:solidFill>
-            </a:endParaRPr>
           </a:p>
         </p:txBody>
       </p:sp>
@@ -38489,18 +38178,13 @@
           <a:lstStyle/>
           <a:p>
             <a:r>
-              <a:rPr lang="en-US" dirty="0" smtClean="0">
+              <a:rPr lang="en-US" dirty="0">
                 <a:solidFill>
                   <a:schemeClr val="accent2"/>
                 </a:solidFill>
               </a:rPr>
               <a:t>System information</a:t>
             </a:r>
-            <a:endParaRPr lang="en-US" dirty="0">
-              <a:solidFill>
-                <a:schemeClr val="accent2"/>
-              </a:solidFill>
-            </a:endParaRPr>
           </a:p>
         </p:txBody>
       </p:sp>
@@ -39162,10 +38846,9 @@
           <a:p>
             <a:pPr algn="r"/>
             <a:r>
-              <a:rPr lang="en-US" dirty="0" smtClean="0"/>
+              <a:rPr lang="en-US" dirty="0"/>
               <a:t>Bash Commands</a:t>
             </a:r>
-            <a:endParaRPr lang="en-US" dirty="0"/>
           </a:p>
         </p:txBody>
       </p:sp>
@@ -39223,13 +38906,6 @@
   <p:transition>
     <p:fade/>
   </p:transition>
-  <p:timing>
-    <p:tnLst>
-      <p:par>
-        <p:cTn id="1" dur="indefinite" restart="never" nodeType="tmRoot"/>
-      </p:par>
-    </p:tnLst>
-  </p:timing>
 </p:sld>
 </file>
 
@@ -39266,10 +38942,9 @@
           <a:lstStyle/>
           <a:p>
             <a:r>
-              <a:rPr lang="en-US" dirty="0" smtClean="0"/>
+              <a:rPr lang="en-US" dirty="0"/>
               <a:t>Basic Bash commands</a:t>
             </a:r>
-            <a:endParaRPr lang="en-US" dirty="0"/>
           </a:p>
         </p:txBody>
       </p:sp>
@@ -39335,15 +39010,7 @@
             </a:r>
             <a:r>
               <a:rPr lang="en-US" dirty="0"/>
-              <a:t> is </a:t>
-            </a:r>
-            <a:r>
-              <a:rPr lang="en-US" dirty="0" smtClean="0"/>
-              <a:t>a folder</a:t>
-            </a:r>
-            <a:r>
-              <a:rPr lang="en-US" dirty="0"/>
-              <a:t>, just like in File Explorer</a:t>
+              <a:t> is a folder, just like in File Explorer</a:t>
             </a:r>
           </a:p>
           <a:p>
@@ -39419,13 +39086,8 @@
             </a:r>
             <a:r>
               <a:rPr lang="en-US" dirty="0"/>
-              <a:t> to know where to </a:t>
+              <a:t> to know where to go</a:t>
             </a:r>
-            <a:r>
-              <a:rPr lang="en-US" dirty="0" smtClean="0"/>
-              <a:t>go</a:t>
-            </a:r>
-            <a:endParaRPr lang="en-US" dirty="0"/>
           </a:p>
         </p:txBody>
       </p:sp>
@@ -39866,11 +39528,11 @@
           <a:lstStyle/>
           <a:p>
             <a:r>
-              <a:rPr lang="en-US" dirty="0" smtClean="0"/>
+              <a:rPr lang="en-US" dirty="0"/>
               <a:t>The </a:t>
             </a:r>
             <a:r>
-              <a:rPr lang="en-US" dirty="0" smtClean="0">
+              <a:rPr lang="en-US" dirty="0">
                 <a:solidFill>
                   <a:schemeClr val="accent1"/>
                 </a:solidFill>
@@ -39879,10 +39541,9 @@
               <a:t>cd</a:t>
             </a:r>
             <a:r>
-              <a:rPr lang="en-US" dirty="0" smtClean="0"/>
+              <a:rPr lang="en-US" dirty="0"/>
               <a:t> command</a:t>
             </a:r>
-            <a:endParaRPr lang="en-US" dirty="0"/>
           </a:p>
         </p:txBody>
       </p:sp>
@@ -39934,10 +39595,9 @@
                     <a:p>
                       <a:pPr algn="ctr"/>
                       <a:r>
-                        <a:rPr lang="en-US" sz="3600" b="0" dirty="0" smtClean="0"/>
+                        <a:rPr lang="en-US" sz="3600" b="0" dirty="0"/>
                         <a:t>When you enter…</a:t>
                       </a:r>
-                      <a:endParaRPr lang="en-US" sz="3600" b="0" dirty="0"/>
                     </a:p>
                   </a:txBody>
                   <a:tcPr anchor="ctr"/>
@@ -39949,10 +39609,9 @@
                     <a:p>
                       <a:pPr algn="ctr"/>
                       <a:r>
-                        <a:rPr lang="en-US" sz="3600" b="0" dirty="0" smtClean="0"/>
+                        <a:rPr lang="en-US" sz="3600" b="0" dirty="0"/>
                         <a:t>The directory changes to…</a:t>
                       </a:r>
-                      <a:endParaRPr lang="en-US" sz="3600" b="0" dirty="0"/>
                     </a:p>
                   </a:txBody>
                   <a:tcPr anchor="ctr"/>
@@ -39971,7 +39630,7 @@
                     <a:p>
                       <a:pPr algn="ctr"/>
                       <a:r>
-                        <a:rPr lang="en-US" sz="4000" dirty="0" smtClean="0">
+                        <a:rPr lang="en-US" sz="4000" dirty="0">
                           <a:solidFill>
                             <a:srgbClr val="00586F"/>
                           </a:solidFill>
@@ -39979,12 +39638,6 @@
                         </a:rPr>
                         <a:t>cd</a:t>
                       </a:r>
-                      <a:endParaRPr lang="en-US" sz="4000" dirty="0">
-                        <a:solidFill>
-                          <a:srgbClr val="00586F"/>
-                        </a:solidFill>
-                        <a:latin typeface="Consolas" panose="020B0609020204030204" pitchFamily="49" charset="0"/>
-                      </a:endParaRPr>
                     </a:p>
                   </a:txBody>
                   <a:tcPr anchor="ctr"/>
@@ -39996,18 +39649,13 @@
                     <a:p>
                       <a:pPr algn="ctr"/>
                       <a:r>
-                        <a:rPr lang="en-US" sz="4000" dirty="0" smtClean="0">
+                        <a:rPr lang="en-US" sz="4000" dirty="0">
                           <a:solidFill>
                             <a:schemeClr val="tx1"/>
                           </a:solidFill>
                         </a:rPr>
                         <a:t>Home directory</a:t>
                       </a:r>
-                      <a:endParaRPr lang="en-US" sz="4000" dirty="0">
-                        <a:solidFill>
-                          <a:schemeClr val="tx1"/>
-                        </a:solidFill>
-                      </a:endParaRPr>
                     </a:p>
                   </a:txBody>
                   <a:tcPr anchor="ctr"/>
@@ -40026,7 +39674,7 @@
                     <a:p>
                       <a:pPr algn="ctr"/>
                       <a:r>
-                        <a:rPr lang="en-US" sz="4000" dirty="0" smtClean="0">
+                        <a:rPr lang="en-US" sz="4000" dirty="0">
                           <a:solidFill>
                             <a:srgbClr val="00586F"/>
                           </a:solidFill>
@@ -40035,7 +39683,7 @@
                         <a:t>cd </a:t>
                       </a:r>
                       <a:r>
-                        <a:rPr lang="en-US" sz="4000" dirty="0" smtClean="0">
+                        <a:rPr lang="en-US" sz="4000" dirty="0">
                           <a:solidFill>
                             <a:schemeClr val="accent1"/>
                           </a:solidFill>
@@ -40043,12 +39691,6 @@
                         </a:rPr>
                         <a:t>&lt;path&gt;</a:t>
                       </a:r>
-                      <a:endParaRPr lang="en-US" sz="4000" dirty="0">
-                        <a:solidFill>
-                          <a:schemeClr val="accent1"/>
-                        </a:solidFill>
-                        <a:latin typeface="Consolas" panose="020B0609020204030204" pitchFamily="49" charset="0"/>
-                      </a:endParaRPr>
                     </a:p>
                   </a:txBody>
                   <a:tcPr anchor="ctr"/>
@@ -40060,18 +39702,13 @@
                     <a:p>
                       <a:pPr algn="ctr"/>
                       <a:r>
-                        <a:rPr lang="en-US" sz="4000" dirty="0" smtClean="0">
+                        <a:rPr lang="en-US" sz="4000" dirty="0">
                           <a:solidFill>
                             <a:schemeClr val="accent1"/>
                           </a:solidFill>
                         </a:rPr>
                         <a:t>&lt;path&gt;</a:t>
                       </a:r>
-                      <a:endParaRPr lang="en-US" sz="4000" dirty="0">
-                        <a:solidFill>
-                          <a:schemeClr val="accent1"/>
-                        </a:solidFill>
-                      </a:endParaRPr>
                     </a:p>
                   </a:txBody>
                   <a:tcPr anchor="ctr"/>
@@ -40090,7 +39727,7 @@
                     <a:p>
                       <a:pPr algn="ctr"/>
                       <a:r>
-                        <a:rPr lang="en-US" sz="4000" dirty="0" smtClean="0">
+                        <a:rPr lang="en-US" sz="4000" dirty="0">
                           <a:solidFill>
                             <a:srgbClr val="00586F"/>
                           </a:solidFill>
@@ -40098,12 +39735,6 @@
                         </a:rPr>
                         <a:t>cd ..</a:t>
                       </a:r>
-                      <a:endParaRPr lang="en-US" sz="4000" dirty="0">
-                        <a:solidFill>
-                          <a:srgbClr val="00586F"/>
-                        </a:solidFill>
-                        <a:latin typeface="Consolas" panose="020B0609020204030204" pitchFamily="49" charset="0"/>
-                      </a:endParaRPr>
                     </a:p>
                   </a:txBody>
                   <a:tcPr anchor="ctr"/>
@@ -40115,18 +39746,13 @@
                     <a:p>
                       <a:pPr algn="ctr"/>
                       <a:r>
-                        <a:rPr lang="en-US" sz="4000" dirty="0" smtClean="0">
+                        <a:rPr lang="en-US" sz="4000" dirty="0">
                           <a:solidFill>
                             <a:schemeClr val="tx1"/>
                           </a:solidFill>
                         </a:rPr>
                         <a:t>One folder level up</a:t>
                       </a:r>
-                      <a:endParaRPr lang="en-US" sz="4000" dirty="0">
-                        <a:solidFill>
-                          <a:schemeClr val="tx1"/>
-                        </a:solidFill>
-                      </a:endParaRPr>
                     </a:p>
                   </a:txBody>
                   <a:tcPr anchor="ctr"/>
@@ -40154,13 +39780,6 @@
   <p:transition>
     <p:fade/>
   </p:transition>
-  <p:timing>
-    <p:tnLst>
-      <p:par>
-        <p:cTn id="1" dur="indefinite" restart="never" nodeType="tmRoot"/>
-      </p:par>
-    </p:tnLst>
-  </p:timing>
 </p:sld>
 </file>
 

</xml_diff>